<commit_message>
Added Project 1 slide, updated Project 2 slide
</commit_message>
<xml_diff>
--- a/Restaurant_Review_System_Overview.pptx
+++ b/Restaurant_Review_System_Overview.pptx
@@ -5,7 +5,8 @@
     <p:sldMasterId id="2147483648" r:id="rId1"/>
   </p:sldMasterIdLst>
   <p:sldIdLst>
-    <p:sldId id="256" r:id="rId2"/>
+    <p:sldId id="257" r:id="rId2"/>
+    <p:sldId id="256" r:id="rId3"/>
   </p:sldIdLst>
   <p:sldSz cx="12192000" cy="6858000"/>
   <p:notesSz cx="6858000" cy="9144000"/>
@@ -259,7 +260,7 @@
           <a:p>
             <a:fld id="{48700426-A4F7-4606-8306-342B510B7CCA}" type="datetimeFigureOut">
               <a:rPr lang="en-US" smtClean="0"/>
-              <a:t>12/3/2023</a:t>
+              <a:t>12/4/2023</a:t>
             </a:fld>
             <a:endParaRPr lang="en-US"/>
           </a:p>
@@ -457,7 +458,7 @@
           <a:p>
             <a:fld id="{48700426-A4F7-4606-8306-342B510B7CCA}" type="datetimeFigureOut">
               <a:rPr lang="en-US" smtClean="0"/>
-              <a:t>12/3/2023</a:t>
+              <a:t>12/4/2023</a:t>
             </a:fld>
             <a:endParaRPr lang="en-US"/>
           </a:p>
@@ -665,7 +666,7 @@
           <a:p>
             <a:fld id="{48700426-A4F7-4606-8306-342B510B7CCA}" type="datetimeFigureOut">
               <a:rPr lang="en-US" smtClean="0"/>
-              <a:t>12/3/2023</a:t>
+              <a:t>12/4/2023</a:t>
             </a:fld>
             <a:endParaRPr lang="en-US"/>
           </a:p>
@@ -863,7 +864,7 @@
           <a:p>
             <a:fld id="{48700426-A4F7-4606-8306-342B510B7CCA}" type="datetimeFigureOut">
               <a:rPr lang="en-US" smtClean="0"/>
-              <a:t>12/3/2023</a:t>
+              <a:t>12/4/2023</a:t>
             </a:fld>
             <a:endParaRPr lang="en-US"/>
           </a:p>
@@ -1138,7 +1139,7 @@
           <a:p>
             <a:fld id="{48700426-A4F7-4606-8306-342B510B7CCA}" type="datetimeFigureOut">
               <a:rPr lang="en-US" smtClean="0"/>
-              <a:t>12/3/2023</a:t>
+              <a:t>12/4/2023</a:t>
             </a:fld>
             <a:endParaRPr lang="en-US"/>
           </a:p>
@@ -1403,7 +1404,7 @@
           <a:p>
             <a:fld id="{48700426-A4F7-4606-8306-342B510B7CCA}" type="datetimeFigureOut">
               <a:rPr lang="en-US" smtClean="0"/>
-              <a:t>12/3/2023</a:t>
+              <a:t>12/4/2023</a:t>
             </a:fld>
             <a:endParaRPr lang="en-US"/>
           </a:p>
@@ -1815,7 +1816,7 @@
           <a:p>
             <a:fld id="{48700426-A4F7-4606-8306-342B510B7CCA}" type="datetimeFigureOut">
               <a:rPr lang="en-US" smtClean="0"/>
-              <a:t>12/3/2023</a:t>
+              <a:t>12/4/2023</a:t>
             </a:fld>
             <a:endParaRPr lang="en-US"/>
           </a:p>
@@ -1956,7 +1957,7 @@
           <a:p>
             <a:fld id="{48700426-A4F7-4606-8306-342B510B7CCA}" type="datetimeFigureOut">
               <a:rPr lang="en-US" smtClean="0"/>
-              <a:t>12/3/2023</a:t>
+              <a:t>12/4/2023</a:t>
             </a:fld>
             <a:endParaRPr lang="en-US"/>
           </a:p>
@@ -2069,7 +2070,7 @@
           <a:p>
             <a:fld id="{48700426-A4F7-4606-8306-342B510B7CCA}" type="datetimeFigureOut">
               <a:rPr lang="en-US" smtClean="0"/>
-              <a:t>12/3/2023</a:t>
+              <a:t>12/4/2023</a:t>
             </a:fld>
             <a:endParaRPr lang="en-US"/>
           </a:p>
@@ -2380,7 +2381,7 @@
           <a:p>
             <a:fld id="{48700426-A4F7-4606-8306-342B510B7CCA}" type="datetimeFigureOut">
               <a:rPr lang="en-US" smtClean="0"/>
-              <a:t>12/3/2023</a:t>
+              <a:t>12/4/2023</a:t>
             </a:fld>
             <a:endParaRPr lang="en-US"/>
           </a:p>
@@ -2668,7 +2669,7 @@
           <a:p>
             <a:fld id="{48700426-A4F7-4606-8306-342B510B7CCA}" type="datetimeFigureOut">
               <a:rPr lang="en-US" smtClean="0"/>
-              <a:t>12/3/2023</a:t>
+              <a:t>12/4/2023</a:t>
             </a:fld>
             <a:endParaRPr lang="en-US"/>
           </a:p>
@@ -2909,7 +2910,7 @@
           <a:p>
             <a:fld id="{48700426-A4F7-4606-8306-342B510B7CCA}" type="datetimeFigureOut">
               <a:rPr lang="en-US" smtClean="0"/>
-              <a:t>12/3/2023</a:t>
+              <a:t>12/4/2023</a:t>
             </a:fld>
             <a:endParaRPr lang="en-US"/>
           </a:p>
@@ -3328,43 +3329,10 @@
       </p:grpSpPr>
       <p:sp>
         <p:nvSpPr>
-          <p:cNvPr id="4" name="Title 3">
-            <a:extLst>
-              <a:ext uri="{FF2B5EF4-FFF2-40B4-BE49-F238E27FC236}">
-                <a16:creationId xmlns:a16="http://schemas.microsoft.com/office/drawing/2014/main" id="{E2F9FF37-0485-33EE-B59B-ADA2FDD12540}"/>
-              </a:ext>
-            </a:extLst>
-          </p:cNvPr>
-          <p:cNvSpPr>
-            <a:spLocks noGrp="1"/>
-          </p:cNvSpPr>
-          <p:nvPr>
-            <p:ph type="title"/>
-          </p:nvPr>
-        </p:nvSpPr>
-        <p:spPr/>
-        <p:txBody>
-          <a:bodyPr/>
-          <a:lstStyle/>
-          <a:p>
-            <a:r>
-              <a:rPr lang="en-US" dirty="0"/>
-              <a:t>System Overview – v1.0 </a:t>
-            </a:r>
-            <a:r>
-              <a:rPr lang="en-US"/>
-              <a:t>(Project 2)</a:t>
-            </a:r>
-            <a:endParaRPr lang="en-US" dirty="0"/>
-          </a:p>
-        </p:txBody>
-      </p:sp>
-      <p:sp>
-        <p:nvSpPr>
-          <p:cNvPr id="6" name="Rectangle: Rounded Corners 5">
-            <a:extLst>
-              <a:ext uri="{FF2B5EF4-FFF2-40B4-BE49-F238E27FC236}">
-                <a16:creationId xmlns:a16="http://schemas.microsoft.com/office/drawing/2014/main" id="{7EB8EA49-FF95-BD08-A3BE-DD63802A7F2A}"/>
+          <p:cNvPr id="9" name="Rectangle: Rounded Corners 8">
+            <a:extLst>
+              <a:ext uri="{FF2B5EF4-FFF2-40B4-BE49-F238E27FC236}">
+                <a16:creationId xmlns:a16="http://schemas.microsoft.com/office/drawing/2014/main" id="{1FBA3E0A-3B1D-FD37-BDAE-BAE45EF2FEBB}"/>
               </a:ext>
             </a:extLst>
           </p:cNvPr>
@@ -3373,8 +3341,8 @@
         </p:nvSpPr>
         <p:spPr>
           <a:xfrm>
-            <a:off x="8939813" y="2647766"/>
-            <a:ext cx="1367162" cy="1032029"/>
+            <a:off x="5584055" y="2567867"/>
+            <a:ext cx="2041863" cy="1722265"/>
           </a:xfrm>
           <a:prstGeom prst="roundRect">
             <a:avLst/>
@@ -3400,6 +3368,411 @@
           </a:fontRef>
         </p:style>
         <p:txBody>
+          <a:bodyPr rtlCol="0" anchor="t"/>
+          <a:lstStyle/>
+          <a:p>
+            <a:pPr algn="ctr"/>
+            <a:r>
+              <a:rPr lang="en-US" dirty="0">
+                <a:solidFill>
+                  <a:schemeClr val="tx1"/>
+                </a:solidFill>
+              </a:rPr>
+              <a:t>REST Service</a:t>
+            </a:r>
+          </a:p>
+        </p:txBody>
+      </p:sp>
+      <p:sp>
+        <p:nvSpPr>
+          <p:cNvPr id="2" name="Title 1">
+            <a:extLst>
+              <a:ext uri="{FF2B5EF4-FFF2-40B4-BE49-F238E27FC236}">
+                <a16:creationId xmlns:a16="http://schemas.microsoft.com/office/drawing/2014/main" id="{57B58C38-628D-D8DE-D78B-AB9E7B707157}"/>
+              </a:ext>
+            </a:extLst>
+          </p:cNvPr>
+          <p:cNvSpPr>
+            <a:spLocks noGrp="1"/>
+          </p:cNvSpPr>
+          <p:nvPr>
+            <p:ph type="title"/>
+          </p:nvPr>
+        </p:nvSpPr>
+        <p:spPr/>
+        <p:txBody>
+          <a:bodyPr/>
+          <a:lstStyle/>
+          <a:p>
+            <a:r>
+              <a:rPr lang="en-US" dirty="0"/>
+              <a:t>System Overview – v0.9 (Project 1)</a:t>
+            </a:r>
+          </a:p>
+        </p:txBody>
+      </p:sp>
+      <p:cxnSp>
+        <p:nvCxnSpPr>
+          <p:cNvPr id="5" name="Straight Arrow Connector 4">
+            <a:extLst>
+              <a:ext uri="{FF2B5EF4-FFF2-40B4-BE49-F238E27FC236}">
+                <a16:creationId xmlns:a16="http://schemas.microsoft.com/office/drawing/2014/main" id="{0F8DFCB3-1C18-1419-0123-68949D343BDC}"/>
+              </a:ext>
+            </a:extLst>
+          </p:cNvPr>
+          <p:cNvCxnSpPr>
+            <a:cxnSpLocks/>
+            <a:stCxn id="6" idx="3"/>
+          </p:cNvCxnSpPr>
+          <p:nvPr/>
+        </p:nvCxnSpPr>
+        <p:spPr>
+          <a:xfrm>
+            <a:off x="4367814" y="3453417"/>
+            <a:ext cx="1216241" cy="0"/>
+          </a:xfrm>
+          <a:prstGeom prst="straightConnector1">
+            <a:avLst/>
+          </a:prstGeom>
+          <a:ln>
+            <a:tailEnd type="triangle"/>
+          </a:ln>
+        </p:spPr>
+        <p:style>
+          <a:lnRef idx="1">
+            <a:schemeClr val="accent1"/>
+          </a:lnRef>
+          <a:fillRef idx="0">
+            <a:schemeClr val="accent1"/>
+          </a:fillRef>
+          <a:effectRef idx="0">
+            <a:schemeClr val="accent1"/>
+          </a:effectRef>
+          <a:fontRef idx="minor">
+            <a:schemeClr val="tx1"/>
+          </a:fontRef>
+        </p:style>
+      </p:cxnSp>
+      <p:sp>
+        <p:nvSpPr>
+          <p:cNvPr id="6" name="Rectangle: Rounded Corners 5">
+            <a:extLst>
+              <a:ext uri="{FF2B5EF4-FFF2-40B4-BE49-F238E27FC236}">
+                <a16:creationId xmlns:a16="http://schemas.microsoft.com/office/drawing/2014/main" id="{E07C0E1F-79ED-D1B0-E4F0-4B54029305B7}"/>
+              </a:ext>
+            </a:extLst>
+          </p:cNvPr>
+          <p:cNvSpPr/>
+          <p:nvPr/>
+        </p:nvSpPr>
+        <p:spPr>
+          <a:xfrm>
+            <a:off x="1944210" y="2849735"/>
+            <a:ext cx="2423604" cy="1207363"/>
+          </a:xfrm>
+          <a:prstGeom prst="roundRect">
+            <a:avLst/>
+          </a:prstGeom>
+        </p:spPr>
+        <p:style>
+          <a:lnRef idx="2">
+            <a:schemeClr val="accent1">
+              <a:shade val="15000"/>
+            </a:schemeClr>
+          </a:lnRef>
+          <a:fillRef idx="1">
+            <a:schemeClr val="accent1"/>
+          </a:fillRef>
+          <a:effectRef idx="0">
+            <a:schemeClr val="accent1"/>
+          </a:effectRef>
+          <a:fontRef idx="minor">
+            <a:schemeClr val="lt1"/>
+          </a:fontRef>
+        </p:style>
+        <p:txBody>
+          <a:bodyPr rtlCol="0" anchor="ctr"/>
+          <a:lstStyle/>
+          <a:p>
+            <a:pPr algn="ctr"/>
+            <a:r>
+              <a:rPr lang="en-US" dirty="0"/>
+              <a:t>Browser/Mobile</a:t>
+            </a:r>
+          </a:p>
+          <a:p>
+            <a:pPr algn="ctr"/>
+            <a:r>
+              <a:rPr lang="en-US" dirty="0"/>
+              <a:t>Device</a:t>
+            </a:r>
+          </a:p>
+        </p:txBody>
+      </p:sp>
+      <p:sp>
+        <p:nvSpPr>
+          <p:cNvPr id="8" name="Rectangle: Rounded Corners 7">
+            <a:extLst>
+              <a:ext uri="{FF2B5EF4-FFF2-40B4-BE49-F238E27FC236}">
+                <a16:creationId xmlns:a16="http://schemas.microsoft.com/office/drawing/2014/main" id="{E762B909-B617-9ED5-B646-47AAD2322061}"/>
+              </a:ext>
+            </a:extLst>
+          </p:cNvPr>
+          <p:cNvSpPr/>
+          <p:nvPr/>
+        </p:nvSpPr>
+        <p:spPr>
+          <a:xfrm>
+            <a:off x="5921405" y="3275863"/>
+            <a:ext cx="1367162" cy="781235"/>
+          </a:xfrm>
+          <a:prstGeom prst="roundRect">
+            <a:avLst/>
+          </a:prstGeom>
+          <a:solidFill>
+            <a:schemeClr val="bg1"/>
+          </a:solidFill>
+        </p:spPr>
+        <p:style>
+          <a:lnRef idx="2">
+            <a:schemeClr val="accent1">
+              <a:shade val="15000"/>
+            </a:schemeClr>
+          </a:lnRef>
+          <a:fillRef idx="1">
+            <a:schemeClr val="accent1"/>
+          </a:fillRef>
+          <a:effectRef idx="0">
+            <a:schemeClr val="accent1"/>
+          </a:effectRef>
+          <a:fontRef idx="minor">
+            <a:schemeClr val="lt1"/>
+          </a:fontRef>
+        </p:style>
+        <p:txBody>
+          <a:bodyPr rtlCol="0" anchor="ctr"/>
+          <a:lstStyle/>
+          <a:p>
+            <a:pPr algn="ctr"/>
+            <a:r>
+              <a:rPr lang="en-US" dirty="0">
+                <a:solidFill>
+                  <a:schemeClr val="tx1"/>
+                </a:solidFill>
+              </a:rPr>
+              <a:t>In-Memory</a:t>
+            </a:r>
+          </a:p>
+          <a:p>
+            <a:pPr algn="ctr"/>
+            <a:r>
+              <a:rPr lang="en-US" dirty="0">
+                <a:solidFill>
+                  <a:schemeClr val="tx1"/>
+                </a:solidFill>
+              </a:rPr>
+              <a:t>Database</a:t>
+            </a:r>
+          </a:p>
+        </p:txBody>
+      </p:sp>
+    </p:spTree>
+    <p:extLst>
+      <p:ext uri="{BB962C8B-B14F-4D97-AF65-F5344CB8AC3E}">
+        <p14:creationId xmlns:p14="http://schemas.microsoft.com/office/powerpoint/2010/main" val="1346342362"/>
+      </p:ext>
+    </p:extLst>
+  </p:cSld>
+  <p:clrMapOvr>
+    <a:masterClrMapping/>
+  </p:clrMapOvr>
+</p:sld>
+</file>
+
+<file path=ppt/slides/slide2.xml><?xml version="1.0" encoding="utf-8"?>
+<p:sld xmlns:a="http://schemas.openxmlformats.org/drawingml/2006/main" xmlns:r="http://schemas.openxmlformats.org/officeDocument/2006/relationships" xmlns:p="http://schemas.openxmlformats.org/presentationml/2006/main">
+  <p:cSld>
+    <p:spTree>
+      <p:nvGrpSpPr>
+        <p:cNvPr id="1" name=""/>
+        <p:cNvGrpSpPr/>
+        <p:nvPr/>
+      </p:nvGrpSpPr>
+      <p:grpSpPr>
+        <a:xfrm>
+          <a:off x="0" y="0"/>
+          <a:ext cx="0" cy="0"/>
+          <a:chOff x="0" y="0"/>
+          <a:chExt cx="0" cy="0"/>
+        </a:xfrm>
+      </p:grpSpPr>
+      <p:sp>
+        <p:nvSpPr>
+          <p:cNvPr id="30" name="Rectangle: Rounded Corners 29">
+            <a:extLst>
+              <a:ext uri="{FF2B5EF4-FFF2-40B4-BE49-F238E27FC236}">
+                <a16:creationId xmlns:a16="http://schemas.microsoft.com/office/drawing/2014/main" id="{D30BE98B-46B6-BF9B-DF6B-0B419B20C753}"/>
+              </a:ext>
+            </a:extLst>
+          </p:cNvPr>
+          <p:cNvSpPr/>
+          <p:nvPr/>
+        </p:nvSpPr>
+        <p:spPr>
+          <a:xfrm>
+            <a:off x="9511636" y="1912632"/>
+            <a:ext cx="1947170" cy="3307440"/>
+          </a:xfrm>
+          <a:prstGeom prst="roundRect">
+            <a:avLst/>
+          </a:prstGeom>
+          <a:solidFill>
+            <a:schemeClr val="bg1"/>
+          </a:solidFill>
+        </p:spPr>
+        <p:style>
+          <a:lnRef idx="2">
+            <a:schemeClr val="accent1">
+              <a:shade val="15000"/>
+            </a:schemeClr>
+          </a:lnRef>
+          <a:fillRef idx="1">
+            <a:schemeClr val="accent1"/>
+          </a:fillRef>
+          <a:effectRef idx="0">
+            <a:schemeClr val="accent1"/>
+          </a:effectRef>
+          <a:fontRef idx="minor">
+            <a:schemeClr val="lt1"/>
+          </a:fontRef>
+        </p:style>
+        <p:txBody>
+          <a:bodyPr rtlCol="0" anchor="ctr"/>
+          <a:lstStyle/>
+          <a:p>
+            <a:pPr algn="ctr"/>
+            <a:endParaRPr lang="en-US"/>
+          </a:p>
+        </p:txBody>
+      </p:sp>
+      <p:sp>
+        <p:nvSpPr>
+          <p:cNvPr id="21" name="Rectangle: Rounded Corners 20">
+            <a:extLst>
+              <a:ext uri="{FF2B5EF4-FFF2-40B4-BE49-F238E27FC236}">
+                <a16:creationId xmlns:a16="http://schemas.microsoft.com/office/drawing/2014/main" id="{CF97D6CA-7583-8189-A662-11185FA74FA7}"/>
+              </a:ext>
+            </a:extLst>
+          </p:cNvPr>
+          <p:cNvSpPr/>
+          <p:nvPr/>
+        </p:nvSpPr>
+        <p:spPr>
+          <a:xfrm>
+            <a:off x="6744062" y="1912632"/>
+            <a:ext cx="1947170" cy="3307440"/>
+          </a:xfrm>
+          <a:prstGeom prst="roundRect">
+            <a:avLst/>
+          </a:prstGeom>
+          <a:solidFill>
+            <a:schemeClr val="bg1"/>
+          </a:solidFill>
+        </p:spPr>
+        <p:style>
+          <a:lnRef idx="2">
+            <a:schemeClr val="accent1">
+              <a:shade val="15000"/>
+            </a:schemeClr>
+          </a:lnRef>
+          <a:fillRef idx="1">
+            <a:schemeClr val="accent1"/>
+          </a:fillRef>
+          <a:effectRef idx="0">
+            <a:schemeClr val="accent1"/>
+          </a:effectRef>
+          <a:fontRef idx="minor">
+            <a:schemeClr val="lt1"/>
+          </a:fontRef>
+        </p:style>
+        <p:txBody>
+          <a:bodyPr rtlCol="0" anchor="ctr"/>
+          <a:lstStyle/>
+          <a:p>
+            <a:pPr algn="ctr"/>
+            <a:endParaRPr lang="en-US" dirty="0"/>
+          </a:p>
+        </p:txBody>
+      </p:sp>
+      <p:sp>
+        <p:nvSpPr>
+          <p:cNvPr id="4" name="Title 3">
+            <a:extLst>
+              <a:ext uri="{FF2B5EF4-FFF2-40B4-BE49-F238E27FC236}">
+                <a16:creationId xmlns:a16="http://schemas.microsoft.com/office/drawing/2014/main" id="{E2F9FF37-0485-33EE-B59B-ADA2FDD12540}"/>
+              </a:ext>
+            </a:extLst>
+          </p:cNvPr>
+          <p:cNvSpPr>
+            <a:spLocks noGrp="1"/>
+          </p:cNvSpPr>
+          <p:nvPr>
+            <p:ph type="title"/>
+          </p:nvPr>
+        </p:nvSpPr>
+        <p:spPr/>
+        <p:txBody>
+          <a:bodyPr/>
+          <a:lstStyle/>
+          <a:p>
+            <a:r>
+              <a:rPr lang="en-US" dirty="0"/>
+              <a:t>System Overview – v1.0 (Project 2)</a:t>
+            </a:r>
+          </a:p>
+        </p:txBody>
+      </p:sp>
+      <p:sp>
+        <p:nvSpPr>
+          <p:cNvPr id="6" name="Rectangle: Rounded Corners 5">
+            <a:extLst>
+              <a:ext uri="{FF2B5EF4-FFF2-40B4-BE49-F238E27FC236}">
+                <a16:creationId xmlns:a16="http://schemas.microsoft.com/office/drawing/2014/main" id="{7EB8EA49-FF95-BD08-A3BE-DD63802A7F2A}"/>
+              </a:ext>
+            </a:extLst>
+          </p:cNvPr>
+          <p:cNvSpPr/>
+          <p:nvPr/>
+        </p:nvSpPr>
+        <p:spPr>
+          <a:xfrm>
+            <a:off x="9856386" y="2234449"/>
+            <a:ext cx="1257670" cy="774579"/>
+          </a:xfrm>
+          <a:prstGeom prst="roundRect">
+            <a:avLst/>
+          </a:prstGeom>
+          <a:solidFill>
+            <a:schemeClr val="bg1"/>
+          </a:solidFill>
+        </p:spPr>
+        <p:style>
+          <a:lnRef idx="2">
+            <a:schemeClr val="accent1">
+              <a:shade val="15000"/>
+            </a:schemeClr>
+          </a:lnRef>
+          <a:fillRef idx="1">
+            <a:schemeClr val="accent1"/>
+          </a:fillRef>
+          <a:effectRef idx="0">
+            <a:schemeClr val="accent1"/>
+          </a:effectRef>
+          <a:fontRef idx="minor">
+            <a:schemeClr val="lt1"/>
+          </a:fontRef>
+        </p:style>
+        <p:txBody>
           <a:bodyPr rtlCol="0" anchor="ctr"/>
           <a:lstStyle/>
           <a:p>
@@ -3440,8 +3813,8 @@
         </p:nvSpPr>
         <p:spPr>
           <a:xfrm>
-            <a:off x="1242874" y="2679947"/>
-            <a:ext cx="1642368" cy="967666"/>
+            <a:off x="7121363" y="2234449"/>
+            <a:ext cx="1192567" cy="707993"/>
           </a:xfrm>
           <a:prstGeom prst="rect">
             <a:avLst/>
@@ -3495,10 +3868,10 @@
       </p:sp>
       <p:sp>
         <p:nvSpPr>
-          <p:cNvPr id="8" name="Rectangle 7">
-            <a:extLst>
-              <a:ext uri="{FF2B5EF4-FFF2-40B4-BE49-F238E27FC236}">
-                <a16:creationId xmlns:a16="http://schemas.microsoft.com/office/drawing/2014/main" id="{884F691A-EDFD-EA3A-E1A5-5BEA7638B99D}"/>
+          <p:cNvPr id="9" name="Oval 8">
+            <a:extLst>
+              <a:ext uri="{FF2B5EF4-FFF2-40B4-BE49-F238E27FC236}">
+                <a16:creationId xmlns:a16="http://schemas.microsoft.com/office/drawing/2014/main" id="{5EC7C779-209B-889A-071E-85DC41A551F1}"/>
               </a:ext>
             </a:extLst>
           </p:cNvPr>
@@ -3507,72 +3880,8 @@
         </p:nvSpPr>
         <p:spPr>
           <a:xfrm>
-            <a:off x="6525086" y="2679947"/>
-            <a:ext cx="1642368" cy="967666"/>
-          </a:xfrm>
-          <a:prstGeom prst="rect">
-            <a:avLst/>
-          </a:prstGeom>
-          <a:solidFill>
-            <a:schemeClr val="bg1"/>
-          </a:solidFill>
-        </p:spPr>
-        <p:style>
-          <a:lnRef idx="2">
-            <a:schemeClr val="accent1">
-              <a:shade val="15000"/>
-            </a:schemeClr>
-          </a:lnRef>
-          <a:fillRef idx="1">
-            <a:schemeClr val="accent1"/>
-          </a:fillRef>
-          <a:effectRef idx="0">
-            <a:schemeClr val="accent1"/>
-          </a:effectRef>
-          <a:fontRef idx="minor">
-            <a:schemeClr val="lt1"/>
-          </a:fontRef>
-        </p:style>
-        <p:txBody>
-          <a:bodyPr rtlCol="0" anchor="ctr"/>
-          <a:lstStyle/>
-          <a:p>
-            <a:pPr algn="ctr"/>
-            <a:r>
-              <a:rPr lang="en-US" dirty="0" err="1">
-                <a:solidFill>
-                  <a:schemeClr val="tx1"/>
-                </a:solidFill>
-              </a:rPr>
-              <a:t>ReadWrite</a:t>
-            </a:r>
-            <a:r>
-              <a:rPr lang="en-US" dirty="0">
-                <a:solidFill>
-                  <a:schemeClr val="tx1"/>
-                </a:solidFill>
-              </a:rPr>
-              <a:t> Service</a:t>
-            </a:r>
-          </a:p>
-        </p:txBody>
-      </p:sp>
-      <p:sp>
-        <p:nvSpPr>
-          <p:cNvPr id="9" name="Oval 8">
-            <a:extLst>
-              <a:ext uri="{FF2B5EF4-FFF2-40B4-BE49-F238E27FC236}">
-                <a16:creationId xmlns:a16="http://schemas.microsoft.com/office/drawing/2014/main" id="{5EC7C779-209B-889A-071E-85DC41A551F1}"/>
-              </a:ext>
-            </a:extLst>
-          </p:cNvPr>
-          <p:cNvSpPr/>
-          <p:nvPr/>
-        </p:nvSpPr>
-        <p:spPr>
-          <a:xfrm>
-            <a:off x="3883980" y="2712129"/>
-            <a:ext cx="1642368" cy="967666"/>
+            <a:off x="3531740" y="2987340"/>
+            <a:ext cx="2212020" cy="967666"/>
           </a:xfrm>
           <a:prstGeom prst="ellipse">
             <a:avLst/>
@@ -3608,7 +3917,7 @@
                   <a:schemeClr val="tx1"/>
                 </a:solidFill>
               </a:rPr>
-              <a:t>Kafka Broker</a:t>
+              <a:t>Eureka Load Balancer</a:t>
             </a:r>
           </a:p>
         </p:txBody>
@@ -3624,14 +3933,15 @@
           </p:cNvPr>
           <p:cNvCxnSpPr>
             <a:cxnSpLocks/>
-            <a:endCxn id="9" idx="1"/>
+            <a:stCxn id="12" idx="3"/>
+            <a:endCxn id="9" idx="2"/>
           </p:cNvCxnSpPr>
           <p:nvPr/>
         </p:nvCxnSpPr>
         <p:spPr>
           <a:xfrm>
-            <a:off x="2885242" y="2853840"/>
-            <a:ext cx="1239257" cy="0"/>
+            <a:off x="2831977" y="3471172"/>
+            <a:ext cx="699763" cy="1"/>
           </a:xfrm>
           <a:prstGeom prst="straightConnector1">
             <a:avLst/>
@@ -3666,14 +3976,388 @@
           </p:cNvPr>
           <p:cNvCxnSpPr>
             <a:cxnSpLocks/>
-            <a:stCxn id="9" idx="7"/>
+            <a:stCxn id="9" idx="6"/>
+            <a:endCxn id="7" idx="1"/>
+          </p:cNvCxnSpPr>
+          <p:nvPr/>
+        </p:nvCxnSpPr>
+        <p:spPr>
+          <a:xfrm flipV="1">
+            <a:off x="5743760" y="2588446"/>
+            <a:ext cx="1377603" cy="882727"/>
+          </a:xfrm>
+          <a:prstGeom prst="straightConnector1">
+            <a:avLst/>
+          </a:prstGeom>
+          <a:ln>
+            <a:tailEnd type="triangle"/>
+          </a:ln>
+        </p:spPr>
+        <p:style>
+          <a:lnRef idx="1">
+            <a:schemeClr val="accent1"/>
+          </a:lnRef>
+          <a:fillRef idx="0">
+            <a:schemeClr val="accent1"/>
+          </a:fillRef>
+          <a:effectRef idx="0">
+            <a:schemeClr val="accent1"/>
+          </a:effectRef>
+          <a:fontRef idx="minor">
+            <a:schemeClr val="tx1"/>
+          </a:fontRef>
+        </p:style>
+      </p:cxnSp>
+      <p:sp>
+        <p:nvSpPr>
+          <p:cNvPr id="12" name="Rectangle: Rounded Corners 11">
+            <a:extLst>
+              <a:ext uri="{FF2B5EF4-FFF2-40B4-BE49-F238E27FC236}">
+                <a16:creationId xmlns:a16="http://schemas.microsoft.com/office/drawing/2014/main" id="{AEB5B2AB-73D9-2829-4DE3-B46C0B863769}"/>
+              </a:ext>
+            </a:extLst>
+          </p:cNvPr>
+          <p:cNvSpPr/>
+          <p:nvPr/>
+        </p:nvSpPr>
+        <p:spPr>
+          <a:xfrm>
+            <a:off x="408373" y="2867490"/>
+            <a:ext cx="2423604" cy="1207363"/>
+          </a:xfrm>
+          <a:prstGeom prst="roundRect">
+            <a:avLst/>
+          </a:prstGeom>
+        </p:spPr>
+        <p:style>
+          <a:lnRef idx="2">
+            <a:schemeClr val="accent1">
+              <a:shade val="15000"/>
+            </a:schemeClr>
+          </a:lnRef>
+          <a:fillRef idx="1">
+            <a:schemeClr val="accent1"/>
+          </a:fillRef>
+          <a:effectRef idx="0">
+            <a:schemeClr val="accent1"/>
+          </a:effectRef>
+          <a:fontRef idx="minor">
+            <a:schemeClr val="lt1"/>
+          </a:fontRef>
+        </p:style>
+        <p:txBody>
+          <a:bodyPr rtlCol="0" anchor="ctr"/>
+          <a:lstStyle/>
+          <a:p>
+            <a:pPr algn="ctr"/>
+            <a:r>
+              <a:rPr lang="en-US" dirty="0"/>
+              <a:t>Browser/Mobile</a:t>
+            </a:r>
+          </a:p>
+          <a:p>
+            <a:pPr algn="ctr"/>
+            <a:r>
+              <a:rPr lang="en-US" dirty="0"/>
+              <a:t>Device</a:t>
+            </a:r>
+          </a:p>
+        </p:txBody>
+      </p:sp>
+      <p:sp>
+        <p:nvSpPr>
+          <p:cNvPr id="22" name="Rectangle 21">
+            <a:extLst>
+              <a:ext uri="{FF2B5EF4-FFF2-40B4-BE49-F238E27FC236}">
+                <a16:creationId xmlns:a16="http://schemas.microsoft.com/office/drawing/2014/main" id="{8A2D57BD-81F6-CB20-25F8-DD39B4C9F998}"/>
+              </a:ext>
+            </a:extLst>
+          </p:cNvPr>
+          <p:cNvSpPr/>
+          <p:nvPr/>
+        </p:nvSpPr>
+        <p:spPr>
+          <a:xfrm>
+            <a:off x="7113225" y="4005450"/>
+            <a:ext cx="1192567" cy="707993"/>
+          </a:xfrm>
+          <a:prstGeom prst="rect">
+            <a:avLst/>
+          </a:prstGeom>
+          <a:solidFill>
+            <a:schemeClr val="bg1"/>
+          </a:solidFill>
+        </p:spPr>
+        <p:style>
+          <a:lnRef idx="2">
+            <a:schemeClr val="accent1">
+              <a:shade val="15000"/>
+            </a:schemeClr>
+          </a:lnRef>
+          <a:fillRef idx="1">
+            <a:schemeClr val="accent1"/>
+          </a:fillRef>
+          <a:effectRef idx="0">
+            <a:schemeClr val="accent1"/>
+          </a:effectRef>
+          <a:fontRef idx="minor">
+            <a:schemeClr val="lt1"/>
+          </a:fontRef>
+        </p:style>
+        <p:txBody>
+          <a:bodyPr rtlCol="0" anchor="ctr"/>
+          <a:lstStyle/>
+          <a:p>
+            <a:pPr algn="ctr"/>
+            <a:r>
+              <a:rPr lang="en-US" dirty="0">
+                <a:solidFill>
+                  <a:schemeClr val="tx1"/>
+                </a:solidFill>
+              </a:rPr>
+              <a:t>REST</a:t>
+            </a:r>
+          </a:p>
+          <a:p>
+            <a:pPr algn="ctr"/>
+            <a:r>
+              <a:rPr lang="en-US" dirty="0">
+                <a:solidFill>
+                  <a:schemeClr val="tx1"/>
+                </a:solidFill>
+              </a:rPr>
+              <a:t>Service</a:t>
+            </a:r>
+          </a:p>
+        </p:txBody>
+      </p:sp>
+      <p:cxnSp>
+        <p:nvCxnSpPr>
+          <p:cNvPr id="28" name="Straight Arrow Connector 27">
+            <a:extLst>
+              <a:ext uri="{FF2B5EF4-FFF2-40B4-BE49-F238E27FC236}">
+                <a16:creationId xmlns:a16="http://schemas.microsoft.com/office/drawing/2014/main" id="{CD9A12CC-2577-30E1-8D39-4B4FEA8BD564}"/>
+              </a:ext>
+            </a:extLst>
+          </p:cNvPr>
+          <p:cNvCxnSpPr>
+            <a:cxnSpLocks/>
+            <a:stCxn id="9" idx="6"/>
+            <a:endCxn id="22" idx="1"/>
           </p:cNvCxnSpPr>
           <p:nvPr/>
         </p:nvCxnSpPr>
         <p:spPr>
           <a:xfrm>
-            <a:off x="5285829" y="2853840"/>
-            <a:ext cx="1239257" cy="0"/>
+            <a:off x="5743760" y="3471173"/>
+            <a:ext cx="1369465" cy="888274"/>
+          </a:xfrm>
+          <a:prstGeom prst="straightConnector1">
+            <a:avLst/>
+          </a:prstGeom>
+          <a:ln>
+            <a:tailEnd type="triangle"/>
+          </a:ln>
+        </p:spPr>
+        <p:style>
+          <a:lnRef idx="1">
+            <a:schemeClr val="accent1"/>
+          </a:lnRef>
+          <a:fillRef idx="0">
+            <a:schemeClr val="accent1"/>
+          </a:fillRef>
+          <a:effectRef idx="0">
+            <a:schemeClr val="accent1"/>
+          </a:effectRef>
+          <a:fontRef idx="minor">
+            <a:schemeClr val="tx1"/>
+          </a:fontRef>
+        </p:style>
+      </p:cxnSp>
+      <p:sp>
+        <p:nvSpPr>
+          <p:cNvPr id="31" name="Rectangle: Rounded Corners 30">
+            <a:extLst>
+              <a:ext uri="{FF2B5EF4-FFF2-40B4-BE49-F238E27FC236}">
+                <a16:creationId xmlns:a16="http://schemas.microsoft.com/office/drawing/2014/main" id="{ABBED353-1493-6AAC-6B04-DE324715AD3E}"/>
+              </a:ext>
+            </a:extLst>
+          </p:cNvPr>
+          <p:cNvSpPr/>
+          <p:nvPr/>
+        </p:nvSpPr>
+        <p:spPr>
+          <a:xfrm>
+            <a:off x="9859299" y="3972156"/>
+            <a:ext cx="1257670" cy="774579"/>
+          </a:xfrm>
+          <a:prstGeom prst="roundRect">
+            <a:avLst/>
+          </a:prstGeom>
+          <a:solidFill>
+            <a:schemeClr val="bg1"/>
+          </a:solidFill>
+        </p:spPr>
+        <p:style>
+          <a:lnRef idx="2">
+            <a:schemeClr val="accent1">
+              <a:shade val="15000"/>
+            </a:schemeClr>
+          </a:lnRef>
+          <a:fillRef idx="1">
+            <a:schemeClr val="accent1"/>
+          </a:fillRef>
+          <a:effectRef idx="0">
+            <a:schemeClr val="accent1"/>
+          </a:effectRef>
+          <a:fontRef idx="minor">
+            <a:schemeClr val="lt1"/>
+          </a:fontRef>
+        </p:style>
+        <p:txBody>
+          <a:bodyPr rtlCol="0" anchor="ctr"/>
+          <a:lstStyle/>
+          <a:p>
+            <a:pPr algn="ctr"/>
+            <a:r>
+              <a:rPr lang="en-US" dirty="0">
+                <a:solidFill>
+                  <a:schemeClr val="tx1"/>
+                </a:solidFill>
+              </a:rPr>
+              <a:t>MongoDB</a:t>
+            </a:r>
+          </a:p>
+          <a:p>
+            <a:pPr algn="ctr"/>
+            <a:r>
+              <a:rPr lang="en-US" dirty="0">
+                <a:solidFill>
+                  <a:schemeClr val="tx1"/>
+                </a:solidFill>
+              </a:rPr>
+              <a:t>Database</a:t>
+            </a:r>
+          </a:p>
+        </p:txBody>
+      </p:sp>
+      <p:sp>
+        <p:nvSpPr>
+          <p:cNvPr id="32" name="TextBox 31">
+            <a:extLst>
+              <a:ext uri="{FF2B5EF4-FFF2-40B4-BE49-F238E27FC236}">
+                <a16:creationId xmlns:a16="http://schemas.microsoft.com/office/drawing/2014/main" id="{0129BBD6-C999-C3CE-E197-3760ACAC6822}"/>
+              </a:ext>
+            </a:extLst>
+          </p:cNvPr>
+          <p:cNvSpPr txBox="1"/>
+          <p:nvPr/>
+        </p:nvSpPr>
+        <p:spPr>
+          <a:xfrm>
+            <a:off x="7588321" y="2942442"/>
+            <a:ext cx="242374" cy="923330"/>
+          </a:xfrm>
+          <a:prstGeom prst="rect">
+            <a:avLst/>
+          </a:prstGeom>
+          <a:noFill/>
+        </p:spPr>
+        <p:txBody>
+          <a:bodyPr wrap="none" rtlCol="0">
+            <a:spAutoFit/>
+          </a:bodyPr>
+          <a:lstStyle/>
+          <a:p>
+            <a:r>
+              <a:rPr lang="en-US" dirty="0"/>
+              <a:t>.</a:t>
+            </a:r>
+            <a:br>
+              <a:rPr lang="en-US" dirty="0"/>
+            </a:br>
+            <a:r>
+              <a:rPr lang="en-US" dirty="0"/>
+              <a:t>.</a:t>
+            </a:r>
+            <a:br>
+              <a:rPr lang="en-US" dirty="0"/>
+            </a:br>
+            <a:r>
+              <a:rPr lang="en-US" dirty="0"/>
+              <a:t>.</a:t>
+            </a:r>
+          </a:p>
+        </p:txBody>
+      </p:sp>
+      <p:sp>
+        <p:nvSpPr>
+          <p:cNvPr id="33" name="TextBox 32">
+            <a:extLst>
+              <a:ext uri="{FF2B5EF4-FFF2-40B4-BE49-F238E27FC236}">
+                <a16:creationId xmlns:a16="http://schemas.microsoft.com/office/drawing/2014/main" id="{2292D2F1-1EE1-DABA-2F2A-D790214A87F4}"/>
+              </a:ext>
+            </a:extLst>
+          </p:cNvPr>
+          <p:cNvSpPr txBox="1"/>
+          <p:nvPr/>
+        </p:nvSpPr>
+        <p:spPr>
+          <a:xfrm>
+            <a:off x="10364034" y="2942442"/>
+            <a:ext cx="242374" cy="923330"/>
+          </a:xfrm>
+          <a:prstGeom prst="rect">
+            <a:avLst/>
+          </a:prstGeom>
+          <a:noFill/>
+        </p:spPr>
+        <p:txBody>
+          <a:bodyPr wrap="none" rtlCol="0">
+            <a:spAutoFit/>
+          </a:bodyPr>
+          <a:lstStyle/>
+          <a:p>
+            <a:r>
+              <a:rPr lang="en-US" dirty="0"/>
+              <a:t>.</a:t>
+            </a:r>
+            <a:br>
+              <a:rPr lang="en-US" dirty="0"/>
+            </a:br>
+            <a:r>
+              <a:rPr lang="en-US" dirty="0"/>
+              <a:t>.</a:t>
+            </a:r>
+            <a:br>
+              <a:rPr lang="en-US" dirty="0"/>
+            </a:br>
+            <a:r>
+              <a:rPr lang="en-US" dirty="0"/>
+              <a:t>.</a:t>
+            </a:r>
+          </a:p>
+        </p:txBody>
+      </p:sp>
+      <p:cxnSp>
+        <p:nvCxnSpPr>
+          <p:cNvPr id="34" name="Straight Arrow Connector 33">
+            <a:extLst>
+              <a:ext uri="{FF2B5EF4-FFF2-40B4-BE49-F238E27FC236}">
+                <a16:creationId xmlns:a16="http://schemas.microsoft.com/office/drawing/2014/main" id="{AB3B720E-2E96-EEAB-A72E-4C4A0D76A43A}"/>
+              </a:ext>
+            </a:extLst>
+          </p:cNvPr>
+          <p:cNvCxnSpPr>
+            <a:cxnSpLocks/>
+            <a:endCxn id="6" idx="1"/>
+          </p:cNvCxnSpPr>
+          <p:nvPr/>
+        </p:nvCxnSpPr>
+        <p:spPr>
+          <a:xfrm flipV="1">
+            <a:off x="8305792" y="2621739"/>
+            <a:ext cx="1550594" cy="2822"/>
           </a:xfrm>
           <a:prstGeom prst="straightConnector1">
             <a:avLst/>
@@ -3699,10 +4383,10 @@
       </p:cxnSp>
       <p:cxnSp>
         <p:nvCxnSpPr>
-          <p:cNvPr id="17" name="Straight Arrow Connector 16">
-            <a:extLst>
-              <a:ext uri="{FF2B5EF4-FFF2-40B4-BE49-F238E27FC236}">
-                <a16:creationId xmlns:a16="http://schemas.microsoft.com/office/drawing/2014/main" id="{355A2E1C-0438-632C-2264-ECB66EF76E70}"/>
+          <p:cNvPr id="36" name="Straight Arrow Connector 35">
+            <a:extLst>
+              <a:ext uri="{FF2B5EF4-FFF2-40B4-BE49-F238E27FC236}">
+                <a16:creationId xmlns:a16="http://schemas.microsoft.com/office/drawing/2014/main" id="{4ACB36F3-9DCA-F068-1137-84DDE2A0FCB9}"/>
               </a:ext>
             </a:extLst>
           </p:cNvPr>
@@ -3712,134 +4396,9 @@
           <p:nvPr/>
         </p:nvCxnSpPr>
         <p:spPr>
-          <a:xfrm>
-            <a:off x="8167454" y="2853840"/>
-            <a:ext cx="772359" cy="0"/>
-          </a:xfrm>
-          <a:prstGeom prst="straightConnector1">
-            <a:avLst/>
-          </a:prstGeom>
-          <a:ln>
-            <a:tailEnd type="triangle"/>
-          </a:ln>
-        </p:spPr>
-        <p:style>
-          <a:lnRef idx="1">
-            <a:schemeClr val="accent1"/>
-          </a:lnRef>
-          <a:fillRef idx="0">
-            <a:schemeClr val="accent1"/>
-          </a:fillRef>
-          <a:effectRef idx="0">
-            <a:schemeClr val="accent1"/>
-          </a:effectRef>
-          <a:fontRef idx="minor">
-            <a:schemeClr val="tx1"/>
-          </a:fontRef>
-        </p:style>
-      </p:cxnSp>
-      <p:cxnSp>
-        <p:nvCxnSpPr>
-          <p:cNvPr id="20" name="Straight Arrow Connector 19">
-            <a:extLst>
-              <a:ext uri="{FF2B5EF4-FFF2-40B4-BE49-F238E27FC236}">
-                <a16:creationId xmlns:a16="http://schemas.microsoft.com/office/drawing/2014/main" id="{E370B5ED-FA5A-BAC9-BADD-FFB195C82E07}"/>
-              </a:ext>
-            </a:extLst>
-          </p:cNvPr>
-          <p:cNvCxnSpPr>
-            <a:cxnSpLocks/>
-          </p:cNvCxnSpPr>
-          <p:nvPr/>
-        </p:nvCxnSpPr>
-        <p:spPr>
-          <a:xfrm flipH="1">
-            <a:off x="8167454" y="3464512"/>
-            <a:ext cx="772359" cy="0"/>
-          </a:xfrm>
-          <a:prstGeom prst="straightConnector1">
-            <a:avLst/>
-          </a:prstGeom>
-          <a:ln>
-            <a:tailEnd type="triangle"/>
-          </a:ln>
-        </p:spPr>
-        <p:style>
-          <a:lnRef idx="1">
-            <a:schemeClr val="accent1"/>
-          </a:lnRef>
-          <a:fillRef idx="0">
-            <a:schemeClr val="accent1"/>
-          </a:fillRef>
-          <a:effectRef idx="0">
-            <a:schemeClr val="accent1"/>
-          </a:effectRef>
-          <a:fontRef idx="minor">
-            <a:schemeClr val="tx1"/>
-          </a:fontRef>
-        </p:style>
-      </p:cxnSp>
-      <p:cxnSp>
-        <p:nvCxnSpPr>
-          <p:cNvPr id="23" name="Straight Arrow Connector 22">
-            <a:extLst>
-              <a:ext uri="{FF2B5EF4-FFF2-40B4-BE49-F238E27FC236}">
-                <a16:creationId xmlns:a16="http://schemas.microsoft.com/office/drawing/2014/main" id="{E352890A-49E6-1A76-FE0E-1B4C1BD6EBD5}"/>
-              </a:ext>
-            </a:extLst>
-          </p:cNvPr>
-          <p:cNvCxnSpPr>
-            <a:cxnSpLocks/>
-            <a:endCxn id="9" idx="5"/>
-          </p:cNvCxnSpPr>
-          <p:nvPr/>
-        </p:nvCxnSpPr>
-        <p:spPr>
-          <a:xfrm flipH="1">
-            <a:off x="5285829" y="3535531"/>
-            <a:ext cx="1221501" cy="2553"/>
-          </a:xfrm>
-          <a:prstGeom prst="straightConnector1">
-            <a:avLst/>
-          </a:prstGeom>
-          <a:ln>
-            <a:tailEnd type="triangle"/>
-          </a:ln>
-        </p:spPr>
-        <p:style>
-          <a:lnRef idx="1">
-            <a:schemeClr val="accent1"/>
-          </a:lnRef>
-          <a:fillRef idx="0">
-            <a:schemeClr val="accent1"/>
-          </a:fillRef>
-          <a:effectRef idx="0">
-            <a:schemeClr val="accent1"/>
-          </a:effectRef>
-          <a:fontRef idx="minor">
-            <a:schemeClr val="tx1"/>
-          </a:fontRef>
-        </p:style>
-      </p:cxnSp>
-      <p:cxnSp>
-        <p:nvCxnSpPr>
-          <p:cNvPr id="26" name="Straight Arrow Connector 25">
-            <a:extLst>
-              <a:ext uri="{FF2B5EF4-FFF2-40B4-BE49-F238E27FC236}">
-                <a16:creationId xmlns:a16="http://schemas.microsoft.com/office/drawing/2014/main" id="{3396D72A-100D-F9D0-37D6-D8C5E045E1ED}"/>
-              </a:ext>
-            </a:extLst>
-          </p:cNvPr>
-          <p:cNvCxnSpPr>
-            <a:cxnSpLocks/>
-            <a:stCxn id="9" idx="3"/>
-          </p:cNvCxnSpPr>
-          <p:nvPr/>
-        </p:nvCxnSpPr>
-        <p:spPr>
-          <a:xfrm flipH="1" flipV="1">
-            <a:off x="2885242" y="3533313"/>
-            <a:ext cx="1239257" cy="4771"/>
+          <a:xfrm flipV="1">
+            <a:off x="8305792" y="4356623"/>
+            <a:ext cx="1550594" cy="2822"/>
           </a:xfrm>
           <a:prstGeom prst="straightConnector1">
             <a:avLst/>

</xml_diff>

<commit_message>
Split Project1 into Project1a and Project1b
</commit_message>
<xml_diff>
--- a/Restaurant_Review_System_Overview.pptx
+++ b/Restaurant_Review_System_Overview.pptx
@@ -3608,55 +3608,6 @@
       </p:grpSpPr>
       <p:sp>
         <p:nvSpPr>
-          <p:cNvPr id="30" name="Rectangle: Rounded Corners 29">
-            <a:extLst>
-              <a:ext uri="{FF2B5EF4-FFF2-40B4-BE49-F238E27FC236}">
-                <a16:creationId xmlns:a16="http://schemas.microsoft.com/office/drawing/2014/main" id="{D30BE98B-46B6-BF9B-DF6B-0B419B20C753}"/>
-              </a:ext>
-            </a:extLst>
-          </p:cNvPr>
-          <p:cNvSpPr/>
-          <p:nvPr/>
-        </p:nvSpPr>
-        <p:spPr>
-          <a:xfrm>
-            <a:off x="9511636" y="1912632"/>
-            <a:ext cx="1947170" cy="3307440"/>
-          </a:xfrm>
-          <a:prstGeom prst="roundRect">
-            <a:avLst/>
-          </a:prstGeom>
-          <a:solidFill>
-            <a:schemeClr val="bg1"/>
-          </a:solidFill>
-        </p:spPr>
-        <p:style>
-          <a:lnRef idx="2">
-            <a:schemeClr val="accent1">
-              <a:shade val="15000"/>
-            </a:schemeClr>
-          </a:lnRef>
-          <a:fillRef idx="1">
-            <a:schemeClr val="accent1"/>
-          </a:fillRef>
-          <a:effectRef idx="0">
-            <a:schemeClr val="accent1"/>
-          </a:effectRef>
-          <a:fontRef idx="minor">
-            <a:schemeClr val="lt1"/>
-          </a:fontRef>
-        </p:style>
-        <p:txBody>
-          <a:bodyPr rtlCol="0" anchor="ctr"/>
-          <a:lstStyle/>
-          <a:p>
-            <a:pPr algn="ctr"/>
-            <a:endParaRPr lang="en-US"/>
-          </a:p>
-        </p:txBody>
-      </p:sp>
-      <p:sp>
-        <p:nvSpPr>
           <p:cNvPr id="21" name="Rectangle: Rounded Corners 20">
             <a:extLst>
               <a:ext uri="{FF2B5EF4-FFF2-40B4-BE49-F238E27FC236}">
@@ -3746,7 +3697,7 @@
         </p:nvSpPr>
         <p:spPr>
           <a:xfrm>
-            <a:off x="9856386" y="2234449"/>
+            <a:off x="9864524" y="3086656"/>
             <a:ext cx="1257670" cy="774579"/>
           </a:xfrm>
           <a:prstGeom prst="roundRect">
@@ -4176,73 +4127,6 @@
       </p:cxnSp>
       <p:sp>
         <p:nvSpPr>
-          <p:cNvPr id="31" name="Rectangle: Rounded Corners 30">
-            <a:extLst>
-              <a:ext uri="{FF2B5EF4-FFF2-40B4-BE49-F238E27FC236}">
-                <a16:creationId xmlns:a16="http://schemas.microsoft.com/office/drawing/2014/main" id="{ABBED353-1493-6AAC-6B04-DE324715AD3E}"/>
-              </a:ext>
-            </a:extLst>
-          </p:cNvPr>
-          <p:cNvSpPr/>
-          <p:nvPr/>
-        </p:nvSpPr>
-        <p:spPr>
-          <a:xfrm>
-            <a:off x="9859299" y="3972156"/>
-            <a:ext cx="1257670" cy="774579"/>
-          </a:xfrm>
-          <a:prstGeom prst="roundRect">
-            <a:avLst/>
-          </a:prstGeom>
-          <a:solidFill>
-            <a:schemeClr val="bg1"/>
-          </a:solidFill>
-        </p:spPr>
-        <p:style>
-          <a:lnRef idx="2">
-            <a:schemeClr val="accent1">
-              <a:shade val="15000"/>
-            </a:schemeClr>
-          </a:lnRef>
-          <a:fillRef idx="1">
-            <a:schemeClr val="accent1"/>
-          </a:fillRef>
-          <a:effectRef idx="0">
-            <a:schemeClr val="accent1"/>
-          </a:effectRef>
-          <a:fontRef idx="minor">
-            <a:schemeClr val="lt1"/>
-          </a:fontRef>
-        </p:style>
-        <p:txBody>
-          <a:bodyPr rtlCol="0" anchor="ctr"/>
-          <a:lstStyle/>
-          <a:p>
-            <a:pPr algn="ctr"/>
-            <a:r>
-              <a:rPr lang="en-US" dirty="0">
-                <a:solidFill>
-                  <a:schemeClr val="tx1"/>
-                </a:solidFill>
-              </a:rPr>
-              <a:t>MongoDB</a:t>
-            </a:r>
-          </a:p>
-          <a:p>
-            <a:pPr algn="ctr"/>
-            <a:r>
-              <a:rPr lang="en-US" dirty="0">
-                <a:solidFill>
-                  <a:schemeClr val="tx1"/>
-                </a:solidFill>
-              </a:rPr>
-              <a:t>Database</a:t>
-            </a:r>
-          </a:p>
-        </p:txBody>
-      </p:sp>
-      <p:sp>
-        <p:nvSpPr>
           <p:cNvPr id="32" name="TextBox 31">
             <a:extLst>
               <a:ext uri="{FF2B5EF4-FFF2-40B4-BE49-F238E27FC236}">
@@ -4290,55 +4174,6 @@
           </a:p>
         </p:txBody>
       </p:sp>
-      <p:sp>
-        <p:nvSpPr>
-          <p:cNvPr id="33" name="TextBox 32">
-            <a:extLst>
-              <a:ext uri="{FF2B5EF4-FFF2-40B4-BE49-F238E27FC236}">
-                <a16:creationId xmlns:a16="http://schemas.microsoft.com/office/drawing/2014/main" id="{2292D2F1-1EE1-DABA-2F2A-D790214A87F4}"/>
-              </a:ext>
-            </a:extLst>
-          </p:cNvPr>
-          <p:cNvSpPr txBox="1"/>
-          <p:nvPr/>
-        </p:nvSpPr>
-        <p:spPr>
-          <a:xfrm>
-            <a:off x="10364034" y="2942442"/>
-            <a:ext cx="242374" cy="923330"/>
-          </a:xfrm>
-          <a:prstGeom prst="rect">
-            <a:avLst/>
-          </a:prstGeom>
-          <a:noFill/>
-        </p:spPr>
-        <p:txBody>
-          <a:bodyPr wrap="none" rtlCol="0">
-            <a:spAutoFit/>
-          </a:bodyPr>
-          <a:lstStyle/>
-          <a:p>
-            <a:r>
-              <a:rPr lang="en-US" dirty="0"/>
-              <a:t>.</a:t>
-            </a:r>
-            <a:br>
-              <a:rPr lang="en-US" dirty="0"/>
-            </a:br>
-            <a:r>
-              <a:rPr lang="en-US" dirty="0"/>
-              <a:t>.</a:t>
-            </a:r>
-            <a:br>
-              <a:rPr lang="en-US" dirty="0"/>
-            </a:br>
-            <a:r>
-              <a:rPr lang="en-US" dirty="0"/>
-              <a:t>.</a:t>
-            </a:r>
-          </a:p>
-        </p:txBody>
-      </p:sp>
       <p:cxnSp>
         <p:nvCxnSpPr>
           <p:cNvPr id="34" name="Straight Arrow Connector 33">
@@ -4355,9 +4190,9 @@
           <p:nvPr/>
         </p:nvCxnSpPr>
         <p:spPr>
-          <a:xfrm flipV="1">
-            <a:off x="8305792" y="2621739"/>
-            <a:ext cx="1550594" cy="2822"/>
+          <a:xfrm>
+            <a:off x="8313930" y="2588446"/>
+            <a:ext cx="1550594" cy="885500"/>
           </a:xfrm>
           <a:prstGeom prst="straightConnector1">
             <a:avLst/>
@@ -4392,13 +4227,14 @@
           </p:cNvPr>
           <p:cNvCxnSpPr>
             <a:cxnSpLocks/>
+            <a:endCxn id="6" idx="1"/>
           </p:cNvCxnSpPr>
           <p:nvPr/>
         </p:nvCxnSpPr>
         <p:spPr>
           <a:xfrm flipV="1">
-            <a:off x="8305792" y="4356623"/>
-            <a:ext cx="1550594" cy="2822"/>
+            <a:off x="8305792" y="3473946"/>
+            <a:ext cx="1558732" cy="885499"/>
           </a:xfrm>
           <a:prstGeom prst="straightConnector1">
             <a:avLst/>

</xml_diff>

<commit_message>
Added project1a, project1b description to README. Updated system overview pptx
</commit_message>
<xml_diff>
--- a/Restaurant_Review_System_Overview.pptx
+++ b/Restaurant_Review_System_Overview.pptx
@@ -6,7 +6,8 @@
   </p:sldMasterIdLst>
   <p:sldIdLst>
     <p:sldId id="257" r:id="rId2"/>
-    <p:sldId id="256" r:id="rId3"/>
+    <p:sldId id="258" r:id="rId3"/>
+    <p:sldId id="256" r:id="rId4"/>
   </p:sldIdLst>
   <p:sldSz cx="12192000" cy="6858000"/>
   <p:notesSz cx="6858000" cy="9144000"/>
@@ -260,7 +261,7 @@
           <a:p>
             <a:fld id="{48700426-A4F7-4606-8306-342B510B7CCA}" type="datetimeFigureOut">
               <a:rPr lang="en-US" smtClean="0"/>
-              <a:t>12/4/2023</a:t>
+              <a:t>12/6/2023</a:t>
             </a:fld>
             <a:endParaRPr lang="en-US"/>
           </a:p>
@@ -458,7 +459,7 @@
           <a:p>
             <a:fld id="{48700426-A4F7-4606-8306-342B510B7CCA}" type="datetimeFigureOut">
               <a:rPr lang="en-US" smtClean="0"/>
-              <a:t>12/4/2023</a:t>
+              <a:t>12/6/2023</a:t>
             </a:fld>
             <a:endParaRPr lang="en-US"/>
           </a:p>
@@ -666,7 +667,7 @@
           <a:p>
             <a:fld id="{48700426-A4F7-4606-8306-342B510B7CCA}" type="datetimeFigureOut">
               <a:rPr lang="en-US" smtClean="0"/>
-              <a:t>12/4/2023</a:t>
+              <a:t>12/6/2023</a:t>
             </a:fld>
             <a:endParaRPr lang="en-US"/>
           </a:p>
@@ -864,7 +865,7 @@
           <a:p>
             <a:fld id="{48700426-A4F7-4606-8306-342B510B7CCA}" type="datetimeFigureOut">
               <a:rPr lang="en-US" smtClean="0"/>
-              <a:t>12/4/2023</a:t>
+              <a:t>12/6/2023</a:t>
             </a:fld>
             <a:endParaRPr lang="en-US"/>
           </a:p>
@@ -1139,7 +1140,7 @@
           <a:p>
             <a:fld id="{48700426-A4F7-4606-8306-342B510B7CCA}" type="datetimeFigureOut">
               <a:rPr lang="en-US" smtClean="0"/>
-              <a:t>12/4/2023</a:t>
+              <a:t>12/6/2023</a:t>
             </a:fld>
             <a:endParaRPr lang="en-US"/>
           </a:p>
@@ -1404,7 +1405,7 @@
           <a:p>
             <a:fld id="{48700426-A4F7-4606-8306-342B510B7CCA}" type="datetimeFigureOut">
               <a:rPr lang="en-US" smtClean="0"/>
-              <a:t>12/4/2023</a:t>
+              <a:t>12/6/2023</a:t>
             </a:fld>
             <a:endParaRPr lang="en-US"/>
           </a:p>
@@ -1816,7 +1817,7 @@
           <a:p>
             <a:fld id="{48700426-A4F7-4606-8306-342B510B7CCA}" type="datetimeFigureOut">
               <a:rPr lang="en-US" smtClean="0"/>
-              <a:t>12/4/2023</a:t>
+              <a:t>12/6/2023</a:t>
             </a:fld>
             <a:endParaRPr lang="en-US"/>
           </a:p>
@@ -1957,7 +1958,7 @@
           <a:p>
             <a:fld id="{48700426-A4F7-4606-8306-342B510B7CCA}" type="datetimeFigureOut">
               <a:rPr lang="en-US" smtClean="0"/>
-              <a:t>12/4/2023</a:t>
+              <a:t>12/6/2023</a:t>
             </a:fld>
             <a:endParaRPr lang="en-US"/>
           </a:p>
@@ -2070,7 +2071,7 @@
           <a:p>
             <a:fld id="{48700426-A4F7-4606-8306-342B510B7CCA}" type="datetimeFigureOut">
               <a:rPr lang="en-US" smtClean="0"/>
-              <a:t>12/4/2023</a:t>
+              <a:t>12/6/2023</a:t>
             </a:fld>
             <a:endParaRPr lang="en-US"/>
           </a:p>
@@ -2381,7 +2382,7 @@
           <a:p>
             <a:fld id="{48700426-A4F7-4606-8306-342B510B7CCA}" type="datetimeFigureOut">
               <a:rPr lang="en-US" smtClean="0"/>
-              <a:t>12/4/2023</a:t>
+              <a:t>12/6/2023</a:t>
             </a:fld>
             <a:endParaRPr lang="en-US"/>
           </a:p>
@@ -2669,7 +2670,7 @@
           <a:p>
             <a:fld id="{48700426-A4F7-4606-8306-342B510B7CCA}" type="datetimeFigureOut">
               <a:rPr lang="en-US" smtClean="0"/>
-              <a:t>12/4/2023</a:t>
+              <a:t>12/6/2023</a:t>
             </a:fld>
             <a:endParaRPr lang="en-US"/>
           </a:p>
@@ -2910,7 +2911,7 @@
           <a:p>
             <a:fld id="{48700426-A4F7-4606-8306-342B510B7CCA}" type="datetimeFigureOut">
               <a:rPr lang="en-US" smtClean="0"/>
-              <a:t>12/4/2023</a:t>
+              <a:t>12/6/2023</a:t>
             </a:fld>
             <a:endParaRPr lang="en-US"/>
           </a:p>
@@ -3406,7 +3407,7 @@
           <a:p>
             <a:r>
               <a:rPr lang="en-US" dirty="0"/>
-              <a:t>System Overview – v0.9 (Project 1)</a:t>
+              <a:t>System Overview – v1.0.0 (Project 1a)</a:t>
             </a:r>
           </a:p>
         </p:txBody>
@@ -3608,10 +3609,10 @@
       </p:grpSpPr>
       <p:sp>
         <p:nvSpPr>
-          <p:cNvPr id="21" name="Rectangle: Rounded Corners 20">
-            <a:extLst>
-              <a:ext uri="{FF2B5EF4-FFF2-40B4-BE49-F238E27FC236}">
-                <a16:creationId xmlns:a16="http://schemas.microsoft.com/office/drawing/2014/main" id="{CF97D6CA-7583-8189-A662-11185FA74FA7}"/>
+          <p:cNvPr id="9" name="Rectangle: Rounded Corners 8">
+            <a:extLst>
+              <a:ext uri="{FF2B5EF4-FFF2-40B4-BE49-F238E27FC236}">
+                <a16:creationId xmlns:a16="http://schemas.microsoft.com/office/drawing/2014/main" id="{1FBA3E0A-3B1D-FD37-BDAE-BAE45EF2FEBB}"/>
               </a:ext>
             </a:extLst>
           </p:cNvPr>
@@ -3620,8 +3621,8 @@
         </p:nvSpPr>
         <p:spPr>
           <a:xfrm>
-            <a:off x="6744062" y="1912632"/>
-            <a:ext cx="1947170" cy="3307440"/>
+            <a:off x="5584055" y="3062798"/>
+            <a:ext cx="1367163" cy="781235"/>
           </a:xfrm>
           <a:prstGeom prst="roundRect">
             <a:avLst/>
@@ -3647,6 +3648,326 @@
           </a:fontRef>
         </p:style>
         <p:txBody>
+          <a:bodyPr rtlCol="0" anchor="t"/>
+          <a:lstStyle/>
+          <a:p>
+            <a:pPr algn="ctr"/>
+            <a:r>
+              <a:rPr lang="en-US" dirty="0">
+                <a:solidFill>
+                  <a:schemeClr val="tx1"/>
+                </a:solidFill>
+              </a:rPr>
+              <a:t>REST Service</a:t>
+            </a:r>
+          </a:p>
+        </p:txBody>
+      </p:sp>
+      <p:sp>
+        <p:nvSpPr>
+          <p:cNvPr id="2" name="Title 1">
+            <a:extLst>
+              <a:ext uri="{FF2B5EF4-FFF2-40B4-BE49-F238E27FC236}">
+                <a16:creationId xmlns:a16="http://schemas.microsoft.com/office/drawing/2014/main" id="{57B58C38-628D-D8DE-D78B-AB9E7B707157}"/>
+              </a:ext>
+            </a:extLst>
+          </p:cNvPr>
+          <p:cNvSpPr>
+            <a:spLocks noGrp="1"/>
+          </p:cNvSpPr>
+          <p:nvPr>
+            <p:ph type="title"/>
+          </p:nvPr>
+        </p:nvSpPr>
+        <p:spPr/>
+        <p:txBody>
+          <a:bodyPr/>
+          <a:lstStyle/>
+          <a:p>
+            <a:r>
+              <a:rPr lang="en-US" dirty="0"/>
+              <a:t>System Overview – v1.1 (Project 1b)</a:t>
+            </a:r>
+          </a:p>
+        </p:txBody>
+      </p:sp>
+      <p:cxnSp>
+        <p:nvCxnSpPr>
+          <p:cNvPr id="5" name="Straight Arrow Connector 4">
+            <a:extLst>
+              <a:ext uri="{FF2B5EF4-FFF2-40B4-BE49-F238E27FC236}">
+                <a16:creationId xmlns:a16="http://schemas.microsoft.com/office/drawing/2014/main" id="{0F8DFCB3-1C18-1419-0123-68949D343BDC}"/>
+              </a:ext>
+            </a:extLst>
+          </p:cNvPr>
+          <p:cNvCxnSpPr>
+            <a:cxnSpLocks/>
+            <a:stCxn id="6" idx="3"/>
+          </p:cNvCxnSpPr>
+          <p:nvPr/>
+        </p:nvCxnSpPr>
+        <p:spPr>
+          <a:xfrm>
+            <a:off x="4367814" y="3453417"/>
+            <a:ext cx="1216241" cy="0"/>
+          </a:xfrm>
+          <a:prstGeom prst="straightConnector1">
+            <a:avLst/>
+          </a:prstGeom>
+          <a:ln>
+            <a:tailEnd type="triangle"/>
+          </a:ln>
+        </p:spPr>
+        <p:style>
+          <a:lnRef idx="1">
+            <a:schemeClr val="accent1"/>
+          </a:lnRef>
+          <a:fillRef idx="0">
+            <a:schemeClr val="accent1"/>
+          </a:fillRef>
+          <a:effectRef idx="0">
+            <a:schemeClr val="accent1"/>
+          </a:effectRef>
+          <a:fontRef idx="minor">
+            <a:schemeClr val="tx1"/>
+          </a:fontRef>
+        </p:style>
+      </p:cxnSp>
+      <p:sp>
+        <p:nvSpPr>
+          <p:cNvPr id="6" name="Rectangle: Rounded Corners 5">
+            <a:extLst>
+              <a:ext uri="{FF2B5EF4-FFF2-40B4-BE49-F238E27FC236}">
+                <a16:creationId xmlns:a16="http://schemas.microsoft.com/office/drawing/2014/main" id="{E07C0E1F-79ED-D1B0-E4F0-4B54029305B7}"/>
+              </a:ext>
+            </a:extLst>
+          </p:cNvPr>
+          <p:cNvSpPr/>
+          <p:nvPr/>
+        </p:nvSpPr>
+        <p:spPr>
+          <a:xfrm>
+            <a:off x="1944210" y="2849735"/>
+            <a:ext cx="2423604" cy="1207363"/>
+          </a:xfrm>
+          <a:prstGeom prst="roundRect">
+            <a:avLst/>
+          </a:prstGeom>
+        </p:spPr>
+        <p:style>
+          <a:lnRef idx="2">
+            <a:schemeClr val="accent1">
+              <a:shade val="15000"/>
+            </a:schemeClr>
+          </a:lnRef>
+          <a:fillRef idx="1">
+            <a:schemeClr val="accent1"/>
+          </a:fillRef>
+          <a:effectRef idx="0">
+            <a:schemeClr val="accent1"/>
+          </a:effectRef>
+          <a:fontRef idx="minor">
+            <a:schemeClr val="lt1"/>
+          </a:fontRef>
+        </p:style>
+        <p:txBody>
+          <a:bodyPr rtlCol="0" anchor="ctr"/>
+          <a:lstStyle/>
+          <a:p>
+            <a:pPr algn="ctr"/>
+            <a:r>
+              <a:rPr lang="en-US" dirty="0"/>
+              <a:t>Browser/Mobile</a:t>
+            </a:r>
+          </a:p>
+          <a:p>
+            <a:pPr algn="ctr"/>
+            <a:r>
+              <a:rPr lang="en-US" dirty="0"/>
+              <a:t>Device</a:t>
+            </a:r>
+          </a:p>
+        </p:txBody>
+      </p:sp>
+      <p:sp>
+        <p:nvSpPr>
+          <p:cNvPr id="8" name="Rectangle: Rounded Corners 7">
+            <a:extLst>
+              <a:ext uri="{FF2B5EF4-FFF2-40B4-BE49-F238E27FC236}">
+                <a16:creationId xmlns:a16="http://schemas.microsoft.com/office/drawing/2014/main" id="{E762B909-B617-9ED5-B646-47AAD2322061}"/>
+              </a:ext>
+            </a:extLst>
+          </p:cNvPr>
+          <p:cNvSpPr/>
+          <p:nvPr/>
+        </p:nvSpPr>
+        <p:spPr>
+          <a:xfrm>
+            <a:off x="8167459" y="3038382"/>
+            <a:ext cx="1367162" cy="781235"/>
+          </a:xfrm>
+          <a:prstGeom prst="roundRect">
+            <a:avLst/>
+          </a:prstGeom>
+          <a:solidFill>
+            <a:schemeClr val="bg1"/>
+          </a:solidFill>
+        </p:spPr>
+        <p:style>
+          <a:lnRef idx="2">
+            <a:schemeClr val="accent1">
+              <a:shade val="15000"/>
+            </a:schemeClr>
+          </a:lnRef>
+          <a:fillRef idx="1">
+            <a:schemeClr val="accent1"/>
+          </a:fillRef>
+          <a:effectRef idx="0">
+            <a:schemeClr val="accent1"/>
+          </a:effectRef>
+          <a:fontRef idx="minor">
+            <a:schemeClr val="lt1"/>
+          </a:fontRef>
+        </p:style>
+        <p:txBody>
+          <a:bodyPr rtlCol="0" anchor="ctr"/>
+          <a:lstStyle/>
+          <a:p>
+            <a:pPr algn="ctr"/>
+            <a:r>
+              <a:rPr lang="en-US" dirty="0">
+                <a:solidFill>
+                  <a:schemeClr val="tx1"/>
+                </a:solidFill>
+              </a:rPr>
+              <a:t>MongoDB</a:t>
+            </a:r>
+          </a:p>
+          <a:p>
+            <a:pPr algn="ctr"/>
+            <a:r>
+              <a:rPr lang="en-US" dirty="0">
+                <a:solidFill>
+                  <a:schemeClr val="tx1"/>
+                </a:solidFill>
+              </a:rPr>
+              <a:t>Database</a:t>
+            </a:r>
+          </a:p>
+        </p:txBody>
+      </p:sp>
+      <p:cxnSp>
+        <p:nvCxnSpPr>
+          <p:cNvPr id="3" name="Straight Arrow Connector 2">
+            <a:extLst>
+              <a:ext uri="{FF2B5EF4-FFF2-40B4-BE49-F238E27FC236}">
+                <a16:creationId xmlns:a16="http://schemas.microsoft.com/office/drawing/2014/main" id="{3CAB8528-92E1-E19B-E744-5C63BEC591A5}"/>
+              </a:ext>
+            </a:extLst>
+          </p:cNvPr>
+          <p:cNvCxnSpPr>
+            <a:cxnSpLocks/>
+          </p:cNvCxnSpPr>
+          <p:nvPr/>
+        </p:nvCxnSpPr>
+        <p:spPr>
+          <a:xfrm>
+            <a:off x="6951218" y="3453415"/>
+            <a:ext cx="1216241" cy="0"/>
+          </a:xfrm>
+          <a:prstGeom prst="straightConnector1">
+            <a:avLst/>
+          </a:prstGeom>
+          <a:ln>
+            <a:tailEnd type="triangle"/>
+          </a:ln>
+        </p:spPr>
+        <p:style>
+          <a:lnRef idx="1">
+            <a:schemeClr val="accent1"/>
+          </a:lnRef>
+          <a:fillRef idx="0">
+            <a:schemeClr val="accent1"/>
+          </a:fillRef>
+          <a:effectRef idx="0">
+            <a:schemeClr val="accent1"/>
+          </a:effectRef>
+          <a:fontRef idx="minor">
+            <a:schemeClr val="tx1"/>
+          </a:fontRef>
+        </p:style>
+      </p:cxnSp>
+    </p:spTree>
+    <p:extLst>
+      <p:ext uri="{BB962C8B-B14F-4D97-AF65-F5344CB8AC3E}">
+        <p14:creationId xmlns:p14="http://schemas.microsoft.com/office/powerpoint/2010/main" val="534704860"/>
+      </p:ext>
+    </p:extLst>
+  </p:cSld>
+  <p:clrMapOvr>
+    <a:masterClrMapping/>
+  </p:clrMapOvr>
+</p:sld>
+</file>
+
+<file path=ppt/slides/slide3.xml><?xml version="1.0" encoding="utf-8"?>
+<p:sld xmlns:a="http://schemas.openxmlformats.org/drawingml/2006/main" xmlns:r="http://schemas.openxmlformats.org/officeDocument/2006/relationships" xmlns:p="http://schemas.openxmlformats.org/presentationml/2006/main">
+  <p:cSld>
+    <p:spTree>
+      <p:nvGrpSpPr>
+        <p:cNvPr id="1" name=""/>
+        <p:cNvGrpSpPr/>
+        <p:nvPr/>
+      </p:nvGrpSpPr>
+      <p:grpSpPr>
+        <a:xfrm>
+          <a:off x="0" y="0"/>
+          <a:ext cx="0" cy="0"/>
+          <a:chOff x="0" y="0"/>
+          <a:chExt cx="0" cy="0"/>
+        </a:xfrm>
+      </p:grpSpPr>
+      <p:sp>
+        <p:nvSpPr>
+          <p:cNvPr id="21" name="Rectangle: Rounded Corners 20">
+            <a:extLst>
+              <a:ext uri="{FF2B5EF4-FFF2-40B4-BE49-F238E27FC236}">
+                <a16:creationId xmlns:a16="http://schemas.microsoft.com/office/drawing/2014/main" id="{CF97D6CA-7583-8189-A662-11185FA74FA7}"/>
+              </a:ext>
+            </a:extLst>
+          </p:cNvPr>
+          <p:cNvSpPr/>
+          <p:nvPr/>
+        </p:nvSpPr>
+        <p:spPr>
+          <a:xfrm>
+            <a:off x="3311372" y="2190314"/>
+            <a:ext cx="7483875" cy="2561714"/>
+          </a:xfrm>
+          <a:prstGeom prst="roundRect">
+            <a:avLst/>
+          </a:prstGeom>
+          <a:solidFill>
+            <a:schemeClr val="bg1"/>
+          </a:solidFill>
+        </p:spPr>
+        <p:style>
+          <a:lnRef idx="2">
+            <a:schemeClr val="accent1">
+              <a:shade val="15000"/>
+            </a:schemeClr>
+          </a:lnRef>
+          <a:fillRef idx="1">
+            <a:schemeClr val="accent1"/>
+          </a:fillRef>
+          <a:effectRef idx="0">
+            <a:schemeClr val="accent1"/>
+          </a:effectRef>
+          <a:fontRef idx="minor">
+            <a:schemeClr val="lt1"/>
+          </a:fontRef>
+        </p:style>
+        <p:txBody>
           <a:bodyPr rtlCol="0" anchor="ctr"/>
           <a:lstStyle/>
           <a:p>
@@ -3678,7 +3999,7 @@
           <a:p>
             <a:r>
               <a:rPr lang="en-US" dirty="0"/>
-              <a:t>System Overview – v1.0 (Project 2)</a:t>
+              <a:t>System Overview – v2.0 (Project 2a)</a:t>
             </a:r>
           </a:p>
         </p:txBody>
@@ -3697,7 +4018,7 @@
         </p:nvSpPr>
         <p:spPr>
           <a:xfrm>
-            <a:off x="9864524" y="3086656"/>
+            <a:off x="8874787" y="3086656"/>
             <a:ext cx="1257670" cy="774579"/>
           </a:xfrm>
           <a:prstGeom prst="roundRect">
@@ -3764,7 +4085,7 @@
         </p:nvSpPr>
         <p:spPr>
           <a:xfrm>
-            <a:off x="7121363" y="2234449"/>
+            <a:off x="6712990" y="3117174"/>
             <a:ext cx="1192567" cy="707993"/>
           </a:xfrm>
           <a:prstGeom prst="rect">
@@ -3868,7 +4189,7 @@
                   <a:schemeClr val="tx1"/>
                 </a:solidFill>
               </a:rPr>
-              <a:t>Eureka Load Balancer</a:t>
+              <a:t>Spring Gateway API</a:t>
             </a:r>
           </a:p>
         </p:txBody>
@@ -3934,8 +4255,8 @@
         </p:nvCxnSpPr>
         <p:spPr>
           <a:xfrm flipV="1">
-            <a:off x="5743760" y="2588446"/>
-            <a:ext cx="1377603" cy="882727"/>
+            <a:off x="5743760" y="3471171"/>
+            <a:ext cx="969230" cy="2"/>
           </a:xfrm>
           <a:prstGeom prst="straightConnector1">
             <a:avLst/>
@@ -4015,93 +4336,26 @@
           </a:p>
         </p:txBody>
       </p:sp>
-      <p:sp>
-        <p:nvSpPr>
-          <p:cNvPr id="22" name="Rectangle 21">
-            <a:extLst>
-              <a:ext uri="{FF2B5EF4-FFF2-40B4-BE49-F238E27FC236}">
-                <a16:creationId xmlns:a16="http://schemas.microsoft.com/office/drawing/2014/main" id="{8A2D57BD-81F6-CB20-25F8-DD39B4C9F998}"/>
-              </a:ext>
-            </a:extLst>
-          </p:cNvPr>
-          <p:cNvSpPr/>
-          <p:nvPr/>
-        </p:nvSpPr>
-        <p:spPr>
-          <a:xfrm>
-            <a:off x="7113225" y="4005450"/>
-            <a:ext cx="1192567" cy="707993"/>
-          </a:xfrm>
-          <a:prstGeom prst="rect">
-            <a:avLst/>
-          </a:prstGeom>
-          <a:solidFill>
-            <a:schemeClr val="bg1"/>
-          </a:solidFill>
-        </p:spPr>
-        <p:style>
-          <a:lnRef idx="2">
-            <a:schemeClr val="accent1">
-              <a:shade val="15000"/>
-            </a:schemeClr>
-          </a:lnRef>
-          <a:fillRef idx="1">
-            <a:schemeClr val="accent1"/>
-          </a:fillRef>
-          <a:effectRef idx="0">
-            <a:schemeClr val="accent1"/>
-          </a:effectRef>
-          <a:fontRef idx="minor">
-            <a:schemeClr val="lt1"/>
-          </a:fontRef>
-        </p:style>
-        <p:txBody>
-          <a:bodyPr rtlCol="0" anchor="ctr"/>
-          <a:lstStyle/>
-          <a:p>
-            <a:pPr algn="ctr"/>
-            <a:r>
-              <a:rPr lang="en-US" dirty="0">
-                <a:solidFill>
-                  <a:schemeClr val="tx1"/>
-                </a:solidFill>
-              </a:rPr>
-              <a:t>REST</a:t>
-            </a:r>
-          </a:p>
-          <a:p>
-            <a:pPr algn="ctr"/>
-            <a:r>
-              <a:rPr lang="en-US" dirty="0">
-                <a:solidFill>
-                  <a:schemeClr val="tx1"/>
-                </a:solidFill>
-              </a:rPr>
-              <a:t>Service</a:t>
-            </a:r>
-          </a:p>
-        </p:txBody>
-      </p:sp>
       <p:cxnSp>
         <p:nvCxnSpPr>
-          <p:cNvPr id="28" name="Straight Arrow Connector 27">
-            <a:extLst>
-              <a:ext uri="{FF2B5EF4-FFF2-40B4-BE49-F238E27FC236}">
-                <a16:creationId xmlns:a16="http://schemas.microsoft.com/office/drawing/2014/main" id="{CD9A12CC-2577-30E1-8D39-4B4FEA8BD564}"/>
+          <p:cNvPr id="34" name="Straight Arrow Connector 33">
+            <a:extLst>
+              <a:ext uri="{FF2B5EF4-FFF2-40B4-BE49-F238E27FC236}">
+                <a16:creationId xmlns:a16="http://schemas.microsoft.com/office/drawing/2014/main" id="{AB3B720E-2E96-EEAB-A72E-4C4A0D76A43A}"/>
               </a:ext>
             </a:extLst>
           </p:cNvPr>
           <p:cNvCxnSpPr>
             <a:cxnSpLocks/>
-            <a:stCxn id="9" idx="6"/>
-            <a:endCxn id="22" idx="1"/>
+            <a:stCxn id="7" idx="3"/>
+            <a:endCxn id="6" idx="1"/>
           </p:cNvCxnSpPr>
           <p:nvPr/>
         </p:nvCxnSpPr>
         <p:spPr>
           <a:xfrm>
-            <a:off x="5743760" y="3471173"/>
-            <a:ext cx="1369465" cy="888274"/>
+            <a:off x="7905557" y="3471171"/>
+            <a:ext cx="969230" cy="2775"/>
           </a:xfrm>
           <a:prstGeom prst="straightConnector1">
             <a:avLst/>
@@ -4127,10 +4381,10 @@
       </p:cxnSp>
       <p:sp>
         <p:nvSpPr>
-          <p:cNvPr id="32" name="TextBox 31">
-            <a:extLst>
-              <a:ext uri="{FF2B5EF4-FFF2-40B4-BE49-F238E27FC236}">
-                <a16:creationId xmlns:a16="http://schemas.microsoft.com/office/drawing/2014/main" id="{0129BBD6-C999-C3CE-E197-3760ACAC6822}"/>
+          <p:cNvPr id="8" name="TextBox 7">
+            <a:extLst>
+              <a:ext uri="{FF2B5EF4-FFF2-40B4-BE49-F238E27FC236}">
+                <a16:creationId xmlns:a16="http://schemas.microsoft.com/office/drawing/2014/main" id="{7AED64B9-9B69-1EB6-0D58-C2E1C4DDD9B0}"/>
               </a:ext>
             </a:extLst>
           </p:cNvPr>
@@ -4139,8 +4393,8 @@
         </p:nvSpPr>
         <p:spPr>
           <a:xfrm>
-            <a:off x="7588321" y="2942442"/>
-            <a:ext cx="242374" cy="923330"/>
+            <a:off x="3636418" y="2219495"/>
+            <a:ext cx="2002664" cy="369332"/>
           </a:xfrm>
           <a:prstGeom prst="rect">
             <a:avLst/>
@@ -4155,109 +4409,11 @@
           <a:p>
             <a:r>
               <a:rPr lang="en-US" dirty="0"/>
-              <a:t>.</a:t>
-            </a:r>
-            <a:br>
-              <a:rPr lang="en-US" dirty="0"/>
-            </a:br>
-            <a:r>
-              <a:rPr lang="en-US" dirty="0"/>
-              <a:t>.</a:t>
-            </a:r>
-            <a:br>
-              <a:rPr lang="en-US" dirty="0"/>
-            </a:br>
-            <a:r>
-              <a:rPr lang="en-US" dirty="0"/>
-              <a:t>.</a:t>
-            </a:r>
-          </a:p>
-        </p:txBody>
-      </p:sp>
-      <p:cxnSp>
-        <p:nvCxnSpPr>
-          <p:cNvPr id="34" name="Straight Arrow Connector 33">
-            <a:extLst>
-              <a:ext uri="{FF2B5EF4-FFF2-40B4-BE49-F238E27FC236}">
-                <a16:creationId xmlns:a16="http://schemas.microsoft.com/office/drawing/2014/main" id="{AB3B720E-2E96-EEAB-A72E-4C4A0D76A43A}"/>
-              </a:ext>
-            </a:extLst>
-          </p:cNvPr>
-          <p:cNvCxnSpPr>
-            <a:cxnSpLocks/>
-            <a:endCxn id="6" idx="1"/>
-          </p:cNvCxnSpPr>
-          <p:nvPr/>
-        </p:nvCxnSpPr>
-        <p:spPr>
-          <a:xfrm>
-            <a:off x="8313930" y="2588446"/>
-            <a:ext cx="1550594" cy="885500"/>
-          </a:xfrm>
-          <a:prstGeom prst="straightConnector1">
-            <a:avLst/>
-          </a:prstGeom>
-          <a:ln>
-            <a:tailEnd type="triangle"/>
-          </a:ln>
-        </p:spPr>
-        <p:style>
-          <a:lnRef idx="1">
-            <a:schemeClr val="accent1"/>
-          </a:lnRef>
-          <a:fillRef idx="0">
-            <a:schemeClr val="accent1"/>
-          </a:fillRef>
-          <a:effectRef idx="0">
-            <a:schemeClr val="accent1"/>
-          </a:effectRef>
-          <a:fontRef idx="minor">
-            <a:schemeClr val="tx1"/>
-          </a:fontRef>
-        </p:style>
-      </p:cxnSp>
-      <p:cxnSp>
-        <p:nvCxnSpPr>
-          <p:cNvPr id="36" name="Straight Arrow Connector 35">
-            <a:extLst>
-              <a:ext uri="{FF2B5EF4-FFF2-40B4-BE49-F238E27FC236}">
-                <a16:creationId xmlns:a16="http://schemas.microsoft.com/office/drawing/2014/main" id="{4ACB36F3-9DCA-F068-1137-84DDE2A0FCB9}"/>
-              </a:ext>
-            </a:extLst>
-          </p:cNvPr>
-          <p:cNvCxnSpPr>
-            <a:cxnSpLocks/>
-            <a:endCxn id="6" idx="1"/>
-          </p:cNvCxnSpPr>
-          <p:nvPr/>
-        </p:nvCxnSpPr>
-        <p:spPr>
-          <a:xfrm flipV="1">
-            <a:off x="8305792" y="3473946"/>
-            <a:ext cx="1558732" cy="885499"/>
-          </a:xfrm>
-          <a:prstGeom prst="straightConnector1">
-            <a:avLst/>
-          </a:prstGeom>
-          <a:ln>
-            <a:tailEnd type="triangle"/>
-          </a:ln>
-        </p:spPr>
-        <p:style>
-          <a:lnRef idx="1">
-            <a:schemeClr val="accent1"/>
-          </a:lnRef>
-          <a:fillRef idx="0">
-            <a:schemeClr val="accent1"/>
-          </a:fillRef>
-          <a:effectRef idx="0">
-            <a:schemeClr val="accent1"/>
-          </a:effectRef>
-          <a:fontRef idx="minor">
-            <a:schemeClr val="tx1"/>
-          </a:fontRef>
-        </p:style>
-      </p:cxnSp>
+              <a:t>Backend Ecosystem</a:t>
+            </a:r>
+          </a:p>
+        </p:txBody>
+      </p:sp>
     </p:spTree>
     <p:extLst>
       <p:ext uri="{BB962C8B-B14F-4D97-AF65-F5344CB8AC3E}">

</xml_diff>

<commit_message>
Updated System Overview pptx and pdf
</commit_message>
<xml_diff>
--- a/Restaurant_Review_System_Overview.pptx
+++ b/Restaurant_Review_System_Overview.pptx
@@ -8,6 +8,7 @@
     <p:sldId id="257" r:id="rId2"/>
     <p:sldId id="258" r:id="rId3"/>
     <p:sldId id="256" r:id="rId4"/>
+    <p:sldId id="259" r:id="rId5"/>
   </p:sldIdLst>
   <p:sldSz cx="12192000" cy="6858000"/>
   <p:notesSz cx="6858000" cy="9144000"/>
@@ -261,7 +262,7 @@
           <a:p>
             <a:fld id="{48700426-A4F7-4606-8306-342B510B7CCA}" type="datetimeFigureOut">
               <a:rPr lang="en-US" smtClean="0"/>
-              <a:t>12/6/2023</a:t>
+              <a:t>12/10/2023</a:t>
             </a:fld>
             <a:endParaRPr lang="en-US"/>
           </a:p>
@@ -459,7 +460,7 @@
           <a:p>
             <a:fld id="{48700426-A4F7-4606-8306-342B510B7CCA}" type="datetimeFigureOut">
               <a:rPr lang="en-US" smtClean="0"/>
-              <a:t>12/6/2023</a:t>
+              <a:t>12/10/2023</a:t>
             </a:fld>
             <a:endParaRPr lang="en-US"/>
           </a:p>
@@ -667,7 +668,7 @@
           <a:p>
             <a:fld id="{48700426-A4F7-4606-8306-342B510B7CCA}" type="datetimeFigureOut">
               <a:rPr lang="en-US" smtClean="0"/>
-              <a:t>12/6/2023</a:t>
+              <a:t>12/10/2023</a:t>
             </a:fld>
             <a:endParaRPr lang="en-US"/>
           </a:p>
@@ -865,7 +866,7 @@
           <a:p>
             <a:fld id="{48700426-A4F7-4606-8306-342B510B7CCA}" type="datetimeFigureOut">
               <a:rPr lang="en-US" smtClean="0"/>
-              <a:t>12/6/2023</a:t>
+              <a:t>12/10/2023</a:t>
             </a:fld>
             <a:endParaRPr lang="en-US"/>
           </a:p>
@@ -1140,7 +1141,7 @@
           <a:p>
             <a:fld id="{48700426-A4F7-4606-8306-342B510B7CCA}" type="datetimeFigureOut">
               <a:rPr lang="en-US" smtClean="0"/>
-              <a:t>12/6/2023</a:t>
+              <a:t>12/10/2023</a:t>
             </a:fld>
             <a:endParaRPr lang="en-US"/>
           </a:p>
@@ -1405,7 +1406,7 @@
           <a:p>
             <a:fld id="{48700426-A4F7-4606-8306-342B510B7CCA}" type="datetimeFigureOut">
               <a:rPr lang="en-US" smtClean="0"/>
-              <a:t>12/6/2023</a:t>
+              <a:t>12/10/2023</a:t>
             </a:fld>
             <a:endParaRPr lang="en-US"/>
           </a:p>
@@ -1817,7 +1818,7 @@
           <a:p>
             <a:fld id="{48700426-A4F7-4606-8306-342B510B7CCA}" type="datetimeFigureOut">
               <a:rPr lang="en-US" smtClean="0"/>
-              <a:t>12/6/2023</a:t>
+              <a:t>12/10/2023</a:t>
             </a:fld>
             <a:endParaRPr lang="en-US"/>
           </a:p>
@@ -1958,7 +1959,7 @@
           <a:p>
             <a:fld id="{48700426-A4F7-4606-8306-342B510B7CCA}" type="datetimeFigureOut">
               <a:rPr lang="en-US" smtClean="0"/>
-              <a:t>12/6/2023</a:t>
+              <a:t>12/10/2023</a:t>
             </a:fld>
             <a:endParaRPr lang="en-US"/>
           </a:p>
@@ -2071,7 +2072,7 @@
           <a:p>
             <a:fld id="{48700426-A4F7-4606-8306-342B510B7CCA}" type="datetimeFigureOut">
               <a:rPr lang="en-US" smtClean="0"/>
-              <a:t>12/6/2023</a:t>
+              <a:t>12/10/2023</a:t>
             </a:fld>
             <a:endParaRPr lang="en-US"/>
           </a:p>
@@ -2382,7 +2383,7 @@
           <a:p>
             <a:fld id="{48700426-A4F7-4606-8306-342B510B7CCA}" type="datetimeFigureOut">
               <a:rPr lang="en-US" smtClean="0"/>
-              <a:t>12/6/2023</a:t>
+              <a:t>12/10/2023</a:t>
             </a:fld>
             <a:endParaRPr lang="en-US"/>
           </a:p>
@@ -2670,7 +2671,7 @@
           <a:p>
             <a:fld id="{48700426-A4F7-4606-8306-342B510B7CCA}" type="datetimeFigureOut">
               <a:rPr lang="en-US" smtClean="0"/>
-              <a:t>12/6/2023</a:t>
+              <a:t>12/10/2023</a:t>
             </a:fld>
             <a:endParaRPr lang="en-US"/>
           </a:p>
@@ -2911,7 +2912,7 @@
           <a:p>
             <a:fld id="{48700426-A4F7-4606-8306-342B510B7CCA}" type="datetimeFigureOut">
               <a:rPr lang="en-US" smtClean="0"/>
-              <a:t>12/6/2023</a:t>
+              <a:t>12/10/2023</a:t>
             </a:fld>
             <a:endParaRPr lang="en-US"/>
           </a:p>
@@ -4427,6 +4428,631 @@
 </p:sld>
 </file>
 
+<file path=ppt/slides/slide4.xml><?xml version="1.0" encoding="utf-8"?>
+<p:sld xmlns:a="http://schemas.openxmlformats.org/drawingml/2006/main" xmlns:r="http://schemas.openxmlformats.org/officeDocument/2006/relationships" xmlns:p="http://schemas.openxmlformats.org/presentationml/2006/main">
+  <p:cSld>
+    <p:spTree>
+      <p:nvGrpSpPr>
+        <p:cNvPr id="1" name=""/>
+        <p:cNvGrpSpPr/>
+        <p:nvPr/>
+      </p:nvGrpSpPr>
+      <p:grpSpPr>
+        <a:xfrm>
+          <a:off x="0" y="0"/>
+          <a:ext cx="0" cy="0"/>
+          <a:chOff x="0" y="0"/>
+          <a:chExt cx="0" cy="0"/>
+        </a:xfrm>
+      </p:grpSpPr>
+      <p:sp>
+        <p:nvSpPr>
+          <p:cNvPr id="21" name="Rectangle: Rounded Corners 20">
+            <a:extLst>
+              <a:ext uri="{FF2B5EF4-FFF2-40B4-BE49-F238E27FC236}">
+                <a16:creationId xmlns:a16="http://schemas.microsoft.com/office/drawing/2014/main" id="{CF97D6CA-7583-8189-A662-11185FA74FA7}"/>
+              </a:ext>
+            </a:extLst>
+          </p:cNvPr>
+          <p:cNvSpPr/>
+          <p:nvPr/>
+        </p:nvSpPr>
+        <p:spPr>
+          <a:xfrm>
+            <a:off x="3311372" y="2190314"/>
+            <a:ext cx="7483875" cy="4103954"/>
+          </a:xfrm>
+          <a:prstGeom prst="roundRect">
+            <a:avLst/>
+          </a:prstGeom>
+          <a:solidFill>
+            <a:schemeClr val="bg1"/>
+          </a:solidFill>
+        </p:spPr>
+        <p:style>
+          <a:lnRef idx="2">
+            <a:schemeClr val="accent1">
+              <a:shade val="15000"/>
+            </a:schemeClr>
+          </a:lnRef>
+          <a:fillRef idx="1">
+            <a:schemeClr val="accent1"/>
+          </a:fillRef>
+          <a:effectRef idx="0">
+            <a:schemeClr val="accent1"/>
+          </a:effectRef>
+          <a:fontRef idx="minor">
+            <a:schemeClr val="lt1"/>
+          </a:fontRef>
+        </p:style>
+        <p:txBody>
+          <a:bodyPr rtlCol="0" anchor="ctr"/>
+          <a:lstStyle/>
+          <a:p>
+            <a:pPr algn="ctr"/>
+            <a:endParaRPr lang="en-US" dirty="0"/>
+          </a:p>
+        </p:txBody>
+      </p:sp>
+      <p:sp>
+        <p:nvSpPr>
+          <p:cNvPr id="4" name="Title 3">
+            <a:extLst>
+              <a:ext uri="{FF2B5EF4-FFF2-40B4-BE49-F238E27FC236}">
+                <a16:creationId xmlns:a16="http://schemas.microsoft.com/office/drawing/2014/main" id="{E2F9FF37-0485-33EE-B59B-ADA2FDD12540}"/>
+              </a:ext>
+            </a:extLst>
+          </p:cNvPr>
+          <p:cNvSpPr>
+            <a:spLocks noGrp="1"/>
+          </p:cNvSpPr>
+          <p:nvPr>
+            <p:ph type="title"/>
+          </p:nvPr>
+        </p:nvSpPr>
+        <p:spPr/>
+        <p:txBody>
+          <a:bodyPr/>
+          <a:lstStyle/>
+          <a:p>
+            <a:r>
+              <a:rPr lang="en-US" dirty="0"/>
+              <a:t>System Overview – v2.1 (Project 2b)</a:t>
+            </a:r>
+          </a:p>
+        </p:txBody>
+      </p:sp>
+      <p:sp>
+        <p:nvSpPr>
+          <p:cNvPr id="6" name="Rectangle: Rounded Corners 5">
+            <a:extLst>
+              <a:ext uri="{FF2B5EF4-FFF2-40B4-BE49-F238E27FC236}">
+                <a16:creationId xmlns:a16="http://schemas.microsoft.com/office/drawing/2014/main" id="{7EB8EA49-FF95-BD08-A3BE-DD63802A7F2A}"/>
+              </a:ext>
+            </a:extLst>
+          </p:cNvPr>
+          <p:cNvSpPr/>
+          <p:nvPr/>
+        </p:nvSpPr>
+        <p:spPr>
+          <a:xfrm>
+            <a:off x="8874787" y="3086656"/>
+            <a:ext cx="1257670" cy="774579"/>
+          </a:xfrm>
+          <a:prstGeom prst="roundRect">
+            <a:avLst/>
+          </a:prstGeom>
+          <a:solidFill>
+            <a:schemeClr val="bg1"/>
+          </a:solidFill>
+        </p:spPr>
+        <p:style>
+          <a:lnRef idx="2">
+            <a:schemeClr val="accent1">
+              <a:shade val="15000"/>
+            </a:schemeClr>
+          </a:lnRef>
+          <a:fillRef idx="1">
+            <a:schemeClr val="accent1"/>
+          </a:fillRef>
+          <a:effectRef idx="0">
+            <a:schemeClr val="accent1"/>
+          </a:effectRef>
+          <a:fontRef idx="minor">
+            <a:schemeClr val="lt1"/>
+          </a:fontRef>
+        </p:style>
+        <p:txBody>
+          <a:bodyPr rtlCol="0" anchor="ctr"/>
+          <a:lstStyle/>
+          <a:p>
+            <a:pPr algn="ctr"/>
+            <a:r>
+              <a:rPr lang="en-US" dirty="0">
+                <a:solidFill>
+                  <a:schemeClr val="tx1"/>
+                </a:solidFill>
+              </a:rPr>
+              <a:t>MongoDB</a:t>
+            </a:r>
+          </a:p>
+          <a:p>
+            <a:pPr algn="ctr"/>
+            <a:r>
+              <a:rPr lang="en-US" dirty="0">
+                <a:solidFill>
+                  <a:schemeClr val="tx1"/>
+                </a:solidFill>
+              </a:rPr>
+              <a:t>Database</a:t>
+            </a:r>
+          </a:p>
+        </p:txBody>
+      </p:sp>
+      <p:sp>
+        <p:nvSpPr>
+          <p:cNvPr id="7" name="Rectangle 6">
+            <a:extLst>
+              <a:ext uri="{FF2B5EF4-FFF2-40B4-BE49-F238E27FC236}">
+                <a16:creationId xmlns:a16="http://schemas.microsoft.com/office/drawing/2014/main" id="{37EED306-C8F7-AFD9-9112-6C01DC515D5C}"/>
+              </a:ext>
+            </a:extLst>
+          </p:cNvPr>
+          <p:cNvSpPr/>
+          <p:nvPr/>
+        </p:nvSpPr>
+        <p:spPr>
+          <a:xfrm>
+            <a:off x="6712990" y="3117174"/>
+            <a:ext cx="1192567" cy="707993"/>
+          </a:xfrm>
+          <a:prstGeom prst="rect">
+            <a:avLst/>
+          </a:prstGeom>
+          <a:solidFill>
+            <a:schemeClr val="bg1"/>
+          </a:solidFill>
+        </p:spPr>
+        <p:style>
+          <a:lnRef idx="2">
+            <a:schemeClr val="accent1">
+              <a:shade val="15000"/>
+            </a:schemeClr>
+          </a:lnRef>
+          <a:fillRef idx="1">
+            <a:schemeClr val="accent1"/>
+          </a:fillRef>
+          <a:effectRef idx="0">
+            <a:schemeClr val="accent1"/>
+          </a:effectRef>
+          <a:fontRef idx="minor">
+            <a:schemeClr val="lt1"/>
+          </a:fontRef>
+        </p:style>
+        <p:txBody>
+          <a:bodyPr rtlCol="0" anchor="ctr"/>
+          <a:lstStyle/>
+          <a:p>
+            <a:pPr algn="ctr"/>
+            <a:r>
+              <a:rPr lang="en-US" dirty="0">
+                <a:solidFill>
+                  <a:schemeClr val="tx1"/>
+                </a:solidFill>
+              </a:rPr>
+              <a:t>REST</a:t>
+            </a:r>
+          </a:p>
+          <a:p>
+            <a:pPr algn="ctr"/>
+            <a:r>
+              <a:rPr lang="en-US" dirty="0">
+                <a:solidFill>
+                  <a:schemeClr val="tx1"/>
+                </a:solidFill>
+              </a:rPr>
+              <a:t>Service</a:t>
+            </a:r>
+          </a:p>
+        </p:txBody>
+      </p:sp>
+      <p:sp>
+        <p:nvSpPr>
+          <p:cNvPr id="9" name="Oval 8">
+            <a:extLst>
+              <a:ext uri="{FF2B5EF4-FFF2-40B4-BE49-F238E27FC236}">
+                <a16:creationId xmlns:a16="http://schemas.microsoft.com/office/drawing/2014/main" id="{5EC7C779-209B-889A-071E-85DC41A551F1}"/>
+              </a:ext>
+            </a:extLst>
+          </p:cNvPr>
+          <p:cNvSpPr/>
+          <p:nvPr/>
+        </p:nvSpPr>
+        <p:spPr>
+          <a:xfrm>
+            <a:off x="3531740" y="2987340"/>
+            <a:ext cx="2212020" cy="967666"/>
+          </a:xfrm>
+          <a:prstGeom prst="ellipse">
+            <a:avLst/>
+          </a:prstGeom>
+          <a:solidFill>
+            <a:schemeClr val="bg1"/>
+          </a:solidFill>
+        </p:spPr>
+        <p:style>
+          <a:lnRef idx="2">
+            <a:schemeClr val="accent1">
+              <a:shade val="15000"/>
+            </a:schemeClr>
+          </a:lnRef>
+          <a:fillRef idx="1">
+            <a:schemeClr val="accent1"/>
+          </a:fillRef>
+          <a:effectRef idx="0">
+            <a:schemeClr val="accent1"/>
+          </a:effectRef>
+          <a:fontRef idx="minor">
+            <a:schemeClr val="lt1"/>
+          </a:fontRef>
+        </p:style>
+        <p:txBody>
+          <a:bodyPr rtlCol="0" anchor="ctr"/>
+          <a:lstStyle/>
+          <a:p>
+            <a:pPr algn="ctr"/>
+            <a:r>
+              <a:rPr lang="en-US" dirty="0">
+                <a:solidFill>
+                  <a:schemeClr val="tx1"/>
+                </a:solidFill>
+              </a:rPr>
+              <a:t>Spring Gateway API</a:t>
+            </a:r>
+          </a:p>
+        </p:txBody>
+      </p:sp>
+      <p:cxnSp>
+        <p:nvCxnSpPr>
+          <p:cNvPr id="11" name="Straight Arrow Connector 10">
+            <a:extLst>
+              <a:ext uri="{FF2B5EF4-FFF2-40B4-BE49-F238E27FC236}">
+                <a16:creationId xmlns:a16="http://schemas.microsoft.com/office/drawing/2014/main" id="{421B8AA4-B7F0-4BD6-3867-3D7479F3FC75}"/>
+              </a:ext>
+            </a:extLst>
+          </p:cNvPr>
+          <p:cNvCxnSpPr>
+            <a:cxnSpLocks/>
+            <a:stCxn id="12" idx="3"/>
+            <a:endCxn id="9" idx="2"/>
+          </p:cNvCxnSpPr>
+          <p:nvPr/>
+        </p:nvCxnSpPr>
+        <p:spPr>
+          <a:xfrm>
+            <a:off x="2831977" y="3471172"/>
+            <a:ext cx="699763" cy="1"/>
+          </a:xfrm>
+          <a:prstGeom prst="straightConnector1">
+            <a:avLst/>
+          </a:prstGeom>
+          <a:ln>
+            <a:tailEnd type="triangle"/>
+          </a:ln>
+        </p:spPr>
+        <p:style>
+          <a:lnRef idx="1">
+            <a:schemeClr val="accent1"/>
+          </a:lnRef>
+          <a:fillRef idx="0">
+            <a:schemeClr val="accent1"/>
+          </a:fillRef>
+          <a:effectRef idx="0">
+            <a:schemeClr val="accent1"/>
+          </a:effectRef>
+          <a:fontRef idx="minor">
+            <a:schemeClr val="tx1"/>
+          </a:fontRef>
+        </p:style>
+      </p:cxnSp>
+      <p:cxnSp>
+        <p:nvCxnSpPr>
+          <p:cNvPr id="14" name="Straight Arrow Connector 13">
+            <a:extLst>
+              <a:ext uri="{FF2B5EF4-FFF2-40B4-BE49-F238E27FC236}">
+                <a16:creationId xmlns:a16="http://schemas.microsoft.com/office/drawing/2014/main" id="{3DF4D062-6521-7E24-AE3C-29B0C1DAACF9}"/>
+              </a:ext>
+            </a:extLst>
+          </p:cNvPr>
+          <p:cNvCxnSpPr>
+            <a:cxnSpLocks/>
+            <a:endCxn id="2" idx="1"/>
+          </p:cNvCxnSpPr>
+          <p:nvPr/>
+        </p:nvCxnSpPr>
+        <p:spPr>
+          <a:xfrm>
+            <a:off x="4924143" y="3955006"/>
+            <a:ext cx="497053" cy="938732"/>
+          </a:xfrm>
+          <a:prstGeom prst="straightConnector1">
+            <a:avLst/>
+          </a:prstGeom>
+          <a:ln>
+            <a:tailEnd type="triangle"/>
+          </a:ln>
+        </p:spPr>
+        <p:style>
+          <a:lnRef idx="1">
+            <a:schemeClr val="accent1"/>
+          </a:lnRef>
+          <a:fillRef idx="0">
+            <a:schemeClr val="accent1"/>
+          </a:fillRef>
+          <a:effectRef idx="0">
+            <a:schemeClr val="accent1"/>
+          </a:effectRef>
+          <a:fontRef idx="minor">
+            <a:schemeClr val="tx1"/>
+          </a:fontRef>
+        </p:style>
+      </p:cxnSp>
+      <p:sp>
+        <p:nvSpPr>
+          <p:cNvPr id="12" name="Rectangle: Rounded Corners 11">
+            <a:extLst>
+              <a:ext uri="{FF2B5EF4-FFF2-40B4-BE49-F238E27FC236}">
+                <a16:creationId xmlns:a16="http://schemas.microsoft.com/office/drawing/2014/main" id="{AEB5B2AB-73D9-2829-4DE3-B46C0B863769}"/>
+              </a:ext>
+            </a:extLst>
+          </p:cNvPr>
+          <p:cNvSpPr/>
+          <p:nvPr/>
+        </p:nvSpPr>
+        <p:spPr>
+          <a:xfrm>
+            <a:off x="408373" y="2867490"/>
+            <a:ext cx="2423604" cy="1207363"/>
+          </a:xfrm>
+          <a:prstGeom prst="roundRect">
+            <a:avLst/>
+          </a:prstGeom>
+        </p:spPr>
+        <p:style>
+          <a:lnRef idx="2">
+            <a:schemeClr val="accent1">
+              <a:shade val="15000"/>
+            </a:schemeClr>
+          </a:lnRef>
+          <a:fillRef idx="1">
+            <a:schemeClr val="accent1"/>
+          </a:fillRef>
+          <a:effectRef idx="0">
+            <a:schemeClr val="accent1"/>
+          </a:effectRef>
+          <a:fontRef idx="minor">
+            <a:schemeClr val="lt1"/>
+          </a:fontRef>
+        </p:style>
+        <p:txBody>
+          <a:bodyPr rtlCol="0" anchor="ctr"/>
+          <a:lstStyle/>
+          <a:p>
+            <a:pPr algn="ctr"/>
+            <a:r>
+              <a:rPr lang="en-US" dirty="0"/>
+              <a:t>Browser/Mobile</a:t>
+            </a:r>
+          </a:p>
+          <a:p>
+            <a:pPr algn="ctr"/>
+            <a:r>
+              <a:rPr lang="en-US" dirty="0"/>
+              <a:t>Device</a:t>
+            </a:r>
+          </a:p>
+        </p:txBody>
+      </p:sp>
+      <p:cxnSp>
+        <p:nvCxnSpPr>
+          <p:cNvPr id="34" name="Straight Arrow Connector 33">
+            <a:extLst>
+              <a:ext uri="{FF2B5EF4-FFF2-40B4-BE49-F238E27FC236}">
+                <a16:creationId xmlns:a16="http://schemas.microsoft.com/office/drawing/2014/main" id="{AB3B720E-2E96-EEAB-A72E-4C4A0D76A43A}"/>
+              </a:ext>
+            </a:extLst>
+          </p:cNvPr>
+          <p:cNvCxnSpPr>
+            <a:cxnSpLocks/>
+            <a:stCxn id="7" idx="3"/>
+            <a:endCxn id="6" idx="1"/>
+          </p:cNvCxnSpPr>
+          <p:nvPr/>
+        </p:nvCxnSpPr>
+        <p:spPr>
+          <a:xfrm>
+            <a:off x="7905557" y="3471171"/>
+            <a:ext cx="969230" cy="2775"/>
+          </a:xfrm>
+          <a:prstGeom prst="straightConnector1">
+            <a:avLst/>
+          </a:prstGeom>
+          <a:ln>
+            <a:tailEnd type="triangle"/>
+          </a:ln>
+        </p:spPr>
+        <p:style>
+          <a:lnRef idx="1">
+            <a:schemeClr val="accent1"/>
+          </a:lnRef>
+          <a:fillRef idx="0">
+            <a:schemeClr val="accent1"/>
+          </a:fillRef>
+          <a:effectRef idx="0">
+            <a:schemeClr val="accent1"/>
+          </a:effectRef>
+          <a:fontRef idx="minor">
+            <a:schemeClr val="tx1"/>
+          </a:fontRef>
+        </p:style>
+      </p:cxnSp>
+      <p:sp>
+        <p:nvSpPr>
+          <p:cNvPr id="8" name="TextBox 7">
+            <a:extLst>
+              <a:ext uri="{FF2B5EF4-FFF2-40B4-BE49-F238E27FC236}">
+                <a16:creationId xmlns:a16="http://schemas.microsoft.com/office/drawing/2014/main" id="{7AED64B9-9B69-1EB6-0D58-C2E1C4DDD9B0}"/>
+              </a:ext>
+            </a:extLst>
+          </p:cNvPr>
+          <p:cNvSpPr txBox="1"/>
+          <p:nvPr/>
+        </p:nvSpPr>
+        <p:spPr>
+          <a:xfrm>
+            <a:off x="3636418" y="2219495"/>
+            <a:ext cx="2002664" cy="369332"/>
+          </a:xfrm>
+          <a:prstGeom prst="rect">
+            <a:avLst/>
+          </a:prstGeom>
+          <a:noFill/>
+        </p:spPr>
+        <p:txBody>
+          <a:bodyPr wrap="none" rtlCol="0">
+            <a:spAutoFit/>
+          </a:bodyPr>
+          <a:lstStyle/>
+          <a:p>
+            <a:r>
+              <a:rPr lang="en-US" dirty="0"/>
+              <a:t>Backend Ecosystem</a:t>
+            </a:r>
+          </a:p>
+        </p:txBody>
+      </p:sp>
+      <p:sp>
+        <p:nvSpPr>
+          <p:cNvPr id="2" name="Oval 1">
+            <a:extLst>
+              <a:ext uri="{FF2B5EF4-FFF2-40B4-BE49-F238E27FC236}">
+                <a16:creationId xmlns:a16="http://schemas.microsoft.com/office/drawing/2014/main" id="{453B9045-950B-BBF8-7483-F7237D1A8946}"/>
+              </a:ext>
+            </a:extLst>
+          </p:cNvPr>
+          <p:cNvSpPr/>
+          <p:nvPr/>
+        </p:nvSpPr>
+        <p:spPr>
+          <a:xfrm>
+            <a:off x="5097253" y="4752027"/>
+            <a:ext cx="2212020" cy="967666"/>
+          </a:xfrm>
+          <a:prstGeom prst="ellipse">
+            <a:avLst/>
+          </a:prstGeom>
+          <a:solidFill>
+            <a:schemeClr val="bg1"/>
+          </a:solidFill>
+        </p:spPr>
+        <p:style>
+          <a:lnRef idx="2">
+            <a:schemeClr val="accent1">
+              <a:shade val="15000"/>
+            </a:schemeClr>
+          </a:lnRef>
+          <a:fillRef idx="1">
+            <a:schemeClr val="accent1"/>
+          </a:fillRef>
+          <a:effectRef idx="0">
+            <a:schemeClr val="accent1"/>
+          </a:effectRef>
+          <a:fontRef idx="minor">
+            <a:schemeClr val="lt1"/>
+          </a:fontRef>
+        </p:style>
+        <p:txBody>
+          <a:bodyPr rtlCol="0" anchor="ctr"/>
+          <a:lstStyle/>
+          <a:p>
+            <a:pPr algn="ctr"/>
+            <a:r>
+              <a:rPr lang="en-US" dirty="0">
+                <a:solidFill>
+                  <a:schemeClr val="tx1"/>
+                </a:solidFill>
+              </a:rPr>
+              <a:t>Eureka</a:t>
+            </a:r>
+          </a:p>
+          <a:p>
+            <a:pPr algn="ctr"/>
+            <a:r>
+              <a:rPr lang="en-US" dirty="0">
+                <a:solidFill>
+                  <a:schemeClr val="tx1"/>
+                </a:solidFill>
+              </a:rPr>
+              <a:t>Load Balancer</a:t>
+            </a:r>
+          </a:p>
+        </p:txBody>
+      </p:sp>
+      <p:cxnSp>
+        <p:nvCxnSpPr>
+          <p:cNvPr id="5" name="Straight Arrow Connector 4">
+            <a:extLst>
+              <a:ext uri="{FF2B5EF4-FFF2-40B4-BE49-F238E27FC236}">
+                <a16:creationId xmlns:a16="http://schemas.microsoft.com/office/drawing/2014/main" id="{360F12AF-65DE-5276-C193-69C297AB93BF}"/>
+              </a:ext>
+            </a:extLst>
+          </p:cNvPr>
+          <p:cNvCxnSpPr>
+            <a:cxnSpLocks/>
+            <a:endCxn id="7" idx="2"/>
+          </p:cNvCxnSpPr>
+          <p:nvPr/>
+        </p:nvCxnSpPr>
+        <p:spPr>
+          <a:xfrm flipV="1">
+            <a:off x="6667129" y="3825167"/>
+            <a:ext cx="642145" cy="955794"/>
+          </a:xfrm>
+          <a:prstGeom prst="straightConnector1">
+            <a:avLst/>
+          </a:prstGeom>
+          <a:ln>
+            <a:tailEnd type="triangle"/>
+          </a:ln>
+        </p:spPr>
+        <p:style>
+          <a:lnRef idx="1">
+            <a:schemeClr val="accent1"/>
+          </a:lnRef>
+          <a:fillRef idx="0">
+            <a:schemeClr val="accent1"/>
+          </a:fillRef>
+          <a:effectRef idx="0">
+            <a:schemeClr val="accent1"/>
+          </a:effectRef>
+          <a:fontRef idx="minor">
+            <a:schemeClr val="tx1"/>
+          </a:fontRef>
+        </p:style>
+      </p:cxnSp>
+    </p:spTree>
+    <p:extLst>
+      <p:ext uri="{BB962C8B-B14F-4D97-AF65-F5344CB8AC3E}">
+        <p14:creationId xmlns:p14="http://schemas.microsoft.com/office/powerpoint/2010/main" val="3614754968"/>
+      </p:ext>
+    </p:extLst>
+  </p:cSld>
+  <p:clrMapOvr>
+    <a:masterClrMapping/>
+  </p:clrMapOvr>
+</p:sld>
+</file>
+
 <file path=ppt/theme/theme1.xml><?xml version="1.0" encoding="utf-8"?>
 <a:theme xmlns:a="http://schemas.openxmlformats.org/drawingml/2006/main" name="Office Theme">
   <a:themeElements>

</xml_diff>

<commit_message>
Added mongo config and data, added updated pptx/pdf
</commit_message>
<xml_diff>
--- a/Restaurant_Review_System_Overview.pptx
+++ b/Restaurant_Review_System_Overview.pptx
@@ -9,6 +9,7 @@
     <p:sldId id="258" r:id="rId3"/>
     <p:sldId id="256" r:id="rId4"/>
     <p:sldId id="259" r:id="rId5"/>
+    <p:sldId id="260" r:id="rId6"/>
   </p:sldIdLst>
   <p:sldSz cx="12192000" cy="6858000"/>
   <p:notesSz cx="6858000" cy="9144000"/>
@@ -262,7 +263,7 @@
           <a:p>
             <a:fld id="{48700426-A4F7-4606-8306-342B510B7CCA}" type="datetimeFigureOut">
               <a:rPr lang="en-US" smtClean="0"/>
-              <a:t>12/10/2023</a:t>
+              <a:t>12/18/2023</a:t>
             </a:fld>
             <a:endParaRPr lang="en-US"/>
           </a:p>
@@ -460,7 +461,7 @@
           <a:p>
             <a:fld id="{48700426-A4F7-4606-8306-342B510B7CCA}" type="datetimeFigureOut">
               <a:rPr lang="en-US" smtClean="0"/>
-              <a:t>12/10/2023</a:t>
+              <a:t>12/18/2023</a:t>
             </a:fld>
             <a:endParaRPr lang="en-US"/>
           </a:p>
@@ -668,7 +669,7 @@
           <a:p>
             <a:fld id="{48700426-A4F7-4606-8306-342B510B7CCA}" type="datetimeFigureOut">
               <a:rPr lang="en-US" smtClean="0"/>
-              <a:t>12/10/2023</a:t>
+              <a:t>12/18/2023</a:t>
             </a:fld>
             <a:endParaRPr lang="en-US"/>
           </a:p>
@@ -866,7 +867,7 @@
           <a:p>
             <a:fld id="{48700426-A4F7-4606-8306-342B510B7CCA}" type="datetimeFigureOut">
               <a:rPr lang="en-US" smtClean="0"/>
-              <a:t>12/10/2023</a:t>
+              <a:t>12/18/2023</a:t>
             </a:fld>
             <a:endParaRPr lang="en-US"/>
           </a:p>
@@ -1141,7 +1142,7 @@
           <a:p>
             <a:fld id="{48700426-A4F7-4606-8306-342B510B7CCA}" type="datetimeFigureOut">
               <a:rPr lang="en-US" smtClean="0"/>
-              <a:t>12/10/2023</a:t>
+              <a:t>12/18/2023</a:t>
             </a:fld>
             <a:endParaRPr lang="en-US"/>
           </a:p>
@@ -1406,7 +1407,7 @@
           <a:p>
             <a:fld id="{48700426-A4F7-4606-8306-342B510B7CCA}" type="datetimeFigureOut">
               <a:rPr lang="en-US" smtClean="0"/>
-              <a:t>12/10/2023</a:t>
+              <a:t>12/18/2023</a:t>
             </a:fld>
             <a:endParaRPr lang="en-US"/>
           </a:p>
@@ -1818,7 +1819,7 @@
           <a:p>
             <a:fld id="{48700426-A4F7-4606-8306-342B510B7CCA}" type="datetimeFigureOut">
               <a:rPr lang="en-US" smtClean="0"/>
-              <a:t>12/10/2023</a:t>
+              <a:t>12/18/2023</a:t>
             </a:fld>
             <a:endParaRPr lang="en-US"/>
           </a:p>
@@ -1959,7 +1960,7 @@
           <a:p>
             <a:fld id="{48700426-A4F7-4606-8306-342B510B7CCA}" type="datetimeFigureOut">
               <a:rPr lang="en-US" smtClean="0"/>
-              <a:t>12/10/2023</a:t>
+              <a:t>12/18/2023</a:t>
             </a:fld>
             <a:endParaRPr lang="en-US"/>
           </a:p>
@@ -2072,7 +2073,7 @@
           <a:p>
             <a:fld id="{48700426-A4F7-4606-8306-342B510B7CCA}" type="datetimeFigureOut">
               <a:rPr lang="en-US" smtClean="0"/>
-              <a:t>12/10/2023</a:t>
+              <a:t>12/18/2023</a:t>
             </a:fld>
             <a:endParaRPr lang="en-US"/>
           </a:p>
@@ -2383,7 +2384,7 @@
           <a:p>
             <a:fld id="{48700426-A4F7-4606-8306-342B510B7CCA}" type="datetimeFigureOut">
               <a:rPr lang="en-US" smtClean="0"/>
-              <a:t>12/10/2023</a:t>
+              <a:t>12/18/2023</a:t>
             </a:fld>
             <a:endParaRPr lang="en-US"/>
           </a:p>
@@ -2671,7 +2672,7 @@
           <a:p>
             <a:fld id="{48700426-A4F7-4606-8306-342B510B7CCA}" type="datetimeFigureOut">
               <a:rPr lang="en-US" smtClean="0"/>
-              <a:t>12/10/2023</a:t>
+              <a:t>12/18/2023</a:t>
             </a:fld>
             <a:endParaRPr lang="en-US"/>
           </a:p>
@@ -2912,7 +2913,7 @@
           <a:p>
             <a:fld id="{48700426-A4F7-4606-8306-342B510B7CCA}" type="datetimeFigureOut">
               <a:rPr lang="en-US" smtClean="0"/>
-              <a:t>12/10/2023</a:t>
+              <a:t>12/18/2023</a:t>
             </a:fld>
             <a:endParaRPr lang="en-US"/>
           </a:p>
@@ -5053,6 +5054,1096 @@
 </p:sld>
 </file>
 
+<file path=ppt/slides/slide5.xml><?xml version="1.0" encoding="utf-8"?>
+<p:sld xmlns:a="http://schemas.openxmlformats.org/drawingml/2006/main" xmlns:r="http://schemas.openxmlformats.org/officeDocument/2006/relationships" xmlns:p="http://schemas.openxmlformats.org/presentationml/2006/main">
+  <p:cSld>
+    <p:spTree>
+      <p:nvGrpSpPr>
+        <p:cNvPr id="1" name=""/>
+        <p:cNvGrpSpPr/>
+        <p:nvPr/>
+      </p:nvGrpSpPr>
+      <p:grpSpPr>
+        <a:xfrm>
+          <a:off x="0" y="0"/>
+          <a:ext cx="0" cy="0"/>
+          <a:chOff x="0" y="0"/>
+          <a:chExt cx="0" cy="0"/>
+        </a:xfrm>
+      </p:grpSpPr>
+      <p:sp>
+        <p:nvSpPr>
+          <p:cNvPr id="21" name="Rectangle: Rounded Corners 20">
+            <a:extLst>
+              <a:ext uri="{FF2B5EF4-FFF2-40B4-BE49-F238E27FC236}">
+                <a16:creationId xmlns:a16="http://schemas.microsoft.com/office/drawing/2014/main" id="{CF97D6CA-7583-8189-A662-11185FA74FA7}"/>
+              </a:ext>
+            </a:extLst>
+          </p:cNvPr>
+          <p:cNvSpPr/>
+          <p:nvPr/>
+        </p:nvSpPr>
+        <p:spPr>
+          <a:xfrm>
+            <a:off x="3311372" y="2190314"/>
+            <a:ext cx="8472255" cy="4095076"/>
+          </a:xfrm>
+          <a:prstGeom prst="roundRect">
+            <a:avLst/>
+          </a:prstGeom>
+          <a:solidFill>
+            <a:schemeClr val="bg1"/>
+          </a:solidFill>
+        </p:spPr>
+        <p:style>
+          <a:lnRef idx="2">
+            <a:schemeClr val="accent1">
+              <a:shade val="15000"/>
+            </a:schemeClr>
+          </a:lnRef>
+          <a:fillRef idx="1">
+            <a:schemeClr val="accent1"/>
+          </a:fillRef>
+          <a:effectRef idx="0">
+            <a:schemeClr val="accent1"/>
+          </a:effectRef>
+          <a:fontRef idx="minor">
+            <a:schemeClr val="lt1"/>
+          </a:fontRef>
+        </p:style>
+        <p:txBody>
+          <a:bodyPr rtlCol="0" anchor="ctr"/>
+          <a:lstStyle/>
+          <a:p>
+            <a:pPr algn="ctr"/>
+            <a:endParaRPr lang="en-US" dirty="0"/>
+          </a:p>
+        </p:txBody>
+      </p:sp>
+      <p:sp>
+        <p:nvSpPr>
+          <p:cNvPr id="19" name="Rectangle: Rounded Corners 18">
+            <a:extLst>
+              <a:ext uri="{FF2B5EF4-FFF2-40B4-BE49-F238E27FC236}">
+                <a16:creationId xmlns:a16="http://schemas.microsoft.com/office/drawing/2014/main" id="{17FEF662-14FC-49D7-1253-32FFEE3684CA}"/>
+              </a:ext>
+            </a:extLst>
+          </p:cNvPr>
+          <p:cNvSpPr/>
+          <p:nvPr/>
+        </p:nvSpPr>
+        <p:spPr>
+          <a:xfrm>
+            <a:off x="9699471" y="2343946"/>
+            <a:ext cx="1836927" cy="3630515"/>
+          </a:xfrm>
+          <a:prstGeom prst="roundRect">
+            <a:avLst/>
+          </a:prstGeom>
+          <a:solidFill>
+            <a:schemeClr val="bg1"/>
+          </a:solidFill>
+        </p:spPr>
+        <p:style>
+          <a:lnRef idx="2">
+            <a:schemeClr val="accent1">
+              <a:shade val="15000"/>
+            </a:schemeClr>
+          </a:lnRef>
+          <a:fillRef idx="1">
+            <a:schemeClr val="accent1"/>
+          </a:fillRef>
+          <a:effectRef idx="0">
+            <a:schemeClr val="accent1"/>
+          </a:effectRef>
+          <a:fontRef idx="minor">
+            <a:schemeClr val="lt1"/>
+          </a:fontRef>
+        </p:style>
+        <p:txBody>
+          <a:bodyPr rtlCol="0" anchor="ctr"/>
+          <a:lstStyle/>
+          <a:p>
+            <a:pPr algn="ctr"/>
+            <a:endParaRPr lang="en-US" dirty="0"/>
+          </a:p>
+        </p:txBody>
+      </p:sp>
+      <p:sp>
+        <p:nvSpPr>
+          <p:cNvPr id="15" name="Rectangle: Rounded Corners 14">
+            <a:extLst>
+              <a:ext uri="{FF2B5EF4-FFF2-40B4-BE49-F238E27FC236}">
+                <a16:creationId xmlns:a16="http://schemas.microsoft.com/office/drawing/2014/main" id="{089BF457-9FEA-3133-945E-064DB1808A7F}"/>
+              </a:ext>
+            </a:extLst>
+          </p:cNvPr>
+          <p:cNvSpPr/>
+          <p:nvPr/>
+        </p:nvSpPr>
+        <p:spPr>
+          <a:xfrm>
+            <a:off x="6916735" y="2343946"/>
+            <a:ext cx="1836927" cy="3630515"/>
+          </a:xfrm>
+          <a:prstGeom prst="roundRect">
+            <a:avLst/>
+          </a:prstGeom>
+          <a:solidFill>
+            <a:schemeClr val="bg1"/>
+          </a:solidFill>
+        </p:spPr>
+        <p:style>
+          <a:lnRef idx="2">
+            <a:schemeClr val="accent1">
+              <a:shade val="15000"/>
+            </a:schemeClr>
+          </a:lnRef>
+          <a:fillRef idx="1">
+            <a:schemeClr val="accent1"/>
+          </a:fillRef>
+          <a:effectRef idx="0">
+            <a:schemeClr val="accent1"/>
+          </a:effectRef>
+          <a:fontRef idx="minor">
+            <a:schemeClr val="lt1"/>
+          </a:fontRef>
+        </p:style>
+        <p:txBody>
+          <a:bodyPr rtlCol="0" anchor="ctr"/>
+          <a:lstStyle/>
+          <a:p>
+            <a:pPr algn="ctr"/>
+            <a:endParaRPr lang="en-US" dirty="0"/>
+          </a:p>
+        </p:txBody>
+      </p:sp>
+      <p:sp>
+        <p:nvSpPr>
+          <p:cNvPr id="4" name="Title 3">
+            <a:extLst>
+              <a:ext uri="{FF2B5EF4-FFF2-40B4-BE49-F238E27FC236}">
+                <a16:creationId xmlns:a16="http://schemas.microsoft.com/office/drawing/2014/main" id="{E2F9FF37-0485-33EE-B59B-ADA2FDD12540}"/>
+              </a:ext>
+            </a:extLst>
+          </p:cNvPr>
+          <p:cNvSpPr>
+            <a:spLocks noGrp="1"/>
+          </p:cNvSpPr>
+          <p:nvPr>
+            <p:ph type="title"/>
+          </p:nvPr>
+        </p:nvSpPr>
+        <p:spPr/>
+        <p:txBody>
+          <a:bodyPr/>
+          <a:lstStyle/>
+          <a:p>
+            <a:r>
+              <a:rPr lang="en-US" dirty="0"/>
+              <a:t>System Overview – v3 (</a:t>
+            </a:r>
+            <a:r>
+              <a:rPr lang="en-US"/>
+              <a:t>Project </a:t>
+            </a:r>
+            <a:r>
+              <a:rPr lang="en-US" dirty="0"/>
+              <a:t>3</a:t>
+            </a:r>
+            <a:r>
+              <a:rPr lang="en-US"/>
+              <a:t>a</a:t>
+            </a:r>
+            <a:r>
+              <a:rPr lang="en-US" dirty="0"/>
+              <a:t>)</a:t>
+            </a:r>
+          </a:p>
+        </p:txBody>
+      </p:sp>
+      <p:sp>
+        <p:nvSpPr>
+          <p:cNvPr id="6" name="Rectangle: Rounded Corners 5">
+            <a:extLst>
+              <a:ext uri="{FF2B5EF4-FFF2-40B4-BE49-F238E27FC236}">
+                <a16:creationId xmlns:a16="http://schemas.microsoft.com/office/drawing/2014/main" id="{7EB8EA49-FF95-BD08-A3BE-DD63802A7F2A}"/>
+              </a:ext>
+            </a:extLst>
+          </p:cNvPr>
+          <p:cNvSpPr/>
+          <p:nvPr/>
+        </p:nvSpPr>
+        <p:spPr>
+          <a:xfrm>
+            <a:off x="10033984" y="3097201"/>
+            <a:ext cx="1257670" cy="774579"/>
+          </a:xfrm>
+          <a:prstGeom prst="roundRect">
+            <a:avLst/>
+          </a:prstGeom>
+          <a:solidFill>
+            <a:schemeClr val="bg1"/>
+          </a:solidFill>
+        </p:spPr>
+        <p:style>
+          <a:lnRef idx="2">
+            <a:schemeClr val="accent1">
+              <a:shade val="15000"/>
+            </a:schemeClr>
+          </a:lnRef>
+          <a:fillRef idx="1">
+            <a:schemeClr val="accent1"/>
+          </a:fillRef>
+          <a:effectRef idx="0">
+            <a:schemeClr val="accent1"/>
+          </a:effectRef>
+          <a:fontRef idx="minor">
+            <a:schemeClr val="lt1"/>
+          </a:fontRef>
+        </p:style>
+        <p:txBody>
+          <a:bodyPr rtlCol="0" anchor="ctr"/>
+          <a:lstStyle/>
+          <a:p>
+            <a:pPr algn="ctr"/>
+            <a:r>
+              <a:rPr lang="en-US" dirty="0">
+                <a:solidFill>
+                  <a:schemeClr val="tx1"/>
+                </a:solidFill>
+              </a:rPr>
+              <a:t>MongoDB</a:t>
+            </a:r>
+          </a:p>
+          <a:p>
+            <a:pPr algn="ctr"/>
+            <a:r>
+              <a:rPr lang="en-US" dirty="0">
+                <a:solidFill>
+                  <a:schemeClr val="tx1"/>
+                </a:solidFill>
+              </a:rPr>
+              <a:t>Database</a:t>
+            </a:r>
+          </a:p>
+        </p:txBody>
+      </p:sp>
+      <p:sp>
+        <p:nvSpPr>
+          <p:cNvPr id="7" name="Rectangle 6">
+            <a:extLst>
+              <a:ext uri="{FF2B5EF4-FFF2-40B4-BE49-F238E27FC236}">
+                <a16:creationId xmlns:a16="http://schemas.microsoft.com/office/drawing/2014/main" id="{37EED306-C8F7-AFD9-9112-6C01DC515D5C}"/>
+              </a:ext>
+            </a:extLst>
+          </p:cNvPr>
+          <p:cNvSpPr/>
+          <p:nvPr/>
+        </p:nvSpPr>
+        <p:spPr>
+          <a:xfrm>
+            <a:off x="7272277" y="2999553"/>
+            <a:ext cx="1192567" cy="707993"/>
+          </a:xfrm>
+          <a:prstGeom prst="rect">
+            <a:avLst/>
+          </a:prstGeom>
+          <a:solidFill>
+            <a:schemeClr val="bg1"/>
+          </a:solidFill>
+        </p:spPr>
+        <p:style>
+          <a:lnRef idx="2">
+            <a:schemeClr val="accent1">
+              <a:shade val="15000"/>
+            </a:schemeClr>
+          </a:lnRef>
+          <a:fillRef idx="1">
+            <a:schemeClr val="accent1"/>
+          </a:fillRef>
+          <a:effectRef idx="0">
+            <a:schemeClr val="accent1"/>
+          </a:effectRef>
+          <a:fontRef idx="minor">
+            <a:schemeClr val="lt1"/>
+          </a:fontRef>
+        </p:style>
+        <p:txBody>
+          <a:bodyPr rtlCol="0" anchor="ctr"/>
+          <a:lstStyle/>
+          <a:p>
+            <a:pPr algn="ctr"/>
+            <a:r>
+              <a:rPr lang="en-US" dirty="0">
+                <a:solidFill>
+                  <a:schemeClr val="tx1"/>
+                </a:solidFill>
+              </a:rPr>
+              <a:t>REST</a:t>
+            </a:r>
+          </a:p>
+          <a:p>
+            <a:pPr algn="ctr"/>
+            <a:r>
+              <a:rPr lang="en-US" dirty="0">
+                <a:solidFill>
+                  <a:schemeClr val="tx1"/>
+                </a:solidFill>
+              </a:rPr>
+              <a:t>Service</a:t>
+            </a:r>
+          </a:p>
+        </p:txBody>
+      </p:sp>
+      <p:sp>
+        <p:nvSpPr>
+          <p:cNvPr id="9" name="Oval 8">
+            <a:extLst>
+              <a:ext uri="{FF2B5EF4-FFF2-40B4-BE49-F238E27FC236}">
+                <a16:creationId xmlns:a16="http://schemas.microsoft.com/office/drawing/2014/main" id="{5EC7C779-209B-889A-071E-85DC41A551F1}"/>
+              </a:ext>
+            </a:extLst>
+          </p:cNvPr>
+          <p:cNvSpPr/>
+          <p:nvPr/>
+        </p:nvSpPr>
+        <p:spPr>
+          <a:xfrm>
+            <a:off x="3531740" y="2987340"/>
+            <a:ext cx="2212020" cy="967666"/>
+          </a:xfrm>
+          <a:prstGeom prst="ellipse">
+            <a:avLst/>
+          </a:prstGeom>
+          <a:solidFill>
+            <a:schemeClr val="bg1"/>
+          </a:solidFill>
+        </p:spPr>
+        <p:style>
+          <a:lnRef idx="2">
+            <a:schemeClr val="accent1">
+              <a:shade val="15000"/>
+            </a:schemeClr>
+          </a:lnRef>
+          <a:fillRef idx="1">
+            <a:schemeClr val="accent1"/>
+          </a:fillRef>
+          <a:effectRef idx="0">
+            <a:schemeClr val="accent1"/>
+          </a:effectRef>
+          <a:fontRef idx="minor">
+            <a:schemeClr val="lt1"/>
+          </a:fontRef>
+        </p:style>
+        <p:txBody>
+          <a:bodyPr rtlCol="0" anchor="ctr"/>
+          <a:lstStyle/>
+          <a:p>
+            <a:pPr algn="ctr"/>
+            <a:r>
+              <a:rPr lang="en-US" dirty="0">
+                <a:solidFill>
+                  <a:schemeClr val="tx1"/>
+                </a:solidFill>
+              </a:rPr>
+              <a:t>Spring Gateway API</a:t>
+            </a:r>
+          </a:p>
+        </p:txBody>
+      </p:sp>
+      <p:cxnSp>
+        <p:nvCxnSpPr>
+          <p:cNvPr id="11" name="Straight Arrow Connector 10">
+            <a:extLst>
+              <a:ext uri="{FF2B5EF4-FFF2-40B4-BE49-F238E27FC236}">
+                <a16:creationId xmlns:a16="http://schemas.microsoft.com/office/drawing/2014/main" id="{421B8AA4-B7F0-4BD6-3867-3D7479F3FC75}"/>
+              </a:ext>
+            </a:extLst>
+          </p:cNvPr>
+          <p:cNvCxnSpPr>
+            <a:cxnSpLocks/>
+            <a:stCxn id="12" idx="3"/>
+            <a:endCxn id="9" idx="2"/>
+          </p:cNvCxnSpPr>
+          <p:nvPr/>
+        </p:nvCxnSpPr>
+        <p:spPr>
+          <a:xfrm>
+            <a:off x="2831977" y="3471172"/>
+            <a:ext cx="699763" cy="1"/>
+          </a:xfrm>
+          <a:prstGeom prst="straightConnector1">
+            <a:avLst/>
+          </a:prstGeom>
+          <a:ln>
+            <a:tailEnd type="triangle"/>
+          </a:ln>
+        </p:spPr>
+        <p:style>
+          <a:lnRef idx="1">
+            <a:schemeClr val="accent1"/>
+          </a:lnRef>
+          <a:fillRef idx="0">
+            <a:schemeClr val="accent1"/>
+          </a:fillRef>
+          <a:effectRef idx="0">
+            <a:schemeClr val="accent1"/>
+          </a:effectRef>
+          <a:fontRef idx="minor">
+            <a:schemeClr val="tx1"/>
+          </a:fontRef>
+        </p:style>
+      </p:cxnSp>
+      <p:cxnSp>
+        <p:nvCxnSpPr>
+          <p:cNvPr id="14" name="Straight Arrow Connector 13">
+            <a:extLst>
+              <a:ext uri="{FF2B5EF4-FFF2-40B4-BE49-F238E27FC236}">
+                <a16:creationId xmlns:a16="http://schemas.microsoft.com/office/drawing/2014/main" id="{3DF4D062-6521-7E24-AE3C-29B0C1DAACF9}"/>
+              </a:ext>
+            </a:extLst>
+          </p:cNvPr>
+          <p:cNvCxnSpPr>
+            <a:cxnSpLocks/>
+            <a:stCxn id="9" idx="4"/>
+          </p:cNvCxnSpPr>
+          <p:nvPr/>
+        </p:nvCxnSpPr>
+        <p:spPr>
+          <a:xfrm>
+            <a:off x="4637750" y="3955006"/>
+            <a:ext cx="14796" cy="681609"/>
+          </a:xfrm>
+          <a:prstGeom prst="straightConnector1">
+            <a:avLst/>
+          </a:prstGeom>
+          <a:ln>
+            <a:tailEnd type="triangle"/>
+          </a:ln>
+        </p:spPr>
+        <p:style>
+          <a:lnRef idx="1">
+            <a:schemeClr val="accent1"/>
+          </a:lnRef>
+          <a:fillRef idx="0">
+            <a:schemeClr val="accent1"/>
+          </a:fillRef>
+          <a:effectRef idx="0">
+            <a:schemeClr val="accent1"/>
+          </a:effectRef>
+          <a:fontRef idx="minor">
+            <a:schemeClr val="tx1"/>
+          </a:fontRef>
+        </p:style>
+      </p:cxnSp>
+      <p:sp>
+        <p:nvSpPr>
+          <p:cNvPr id="12" name="Rectangle: Rounded Corners 11">
+            <a:extLst>
+              <a:ext uri="{FF2B5EF4-FFF2-40B4-BE49-F238E27FC236}">
+                <a16:creationId xmlns:a16="http://schemas.microsoft.com/office/drawing/2014/main" id="{AEB5B2AB-73D9-2829-4DE3-B46C0B863769}"/>
+              </a:ext>
+            </a:extLst>
+          </p:cNvPr>
+          <p:cNvSpPr/>
+          <p:nvPr/>
+        </p:nvSpPr>
+        <p:spPr>
+          <a:xfrm>
+            <a:off x="408373" y="2867490"/>
+            <a:ext cx="2423604" cy="1207363"/>
+          </a:xfrm>
+          <a:prstGeom prst="roundRect">
+            <a:avLst/>
+          </a:prstGeom>
+        </p:spPr>
+        <p:style>
+          <a:lnRef idx="2">
+            <a:schemeClr val="accent1">
+              <a:shade val="15000"/>
+            </a:schemeClr>
+          </a:lnRef>
+          <a:fillRef idx="1">
+            <a:schemeClr val="accent1"/>
+          </a:fillRef>
+          <a:effectRef idx="0">
+            <a:schemeClr val="accent1"/>
+          </a:effectRef>
+          <a:fontRef idx="minor">
+            <a:schemeClr val="lt1"/>
+          </a:fontRef>
+        </p:style>
+        <p:txBody>
+          <a:bodyPr rtlCol="0" anchor="ctr"/>
+          <a:lstStyle/>
+          <a:p>
+            <a:pPr algn="ctr"/>
+            <a:r>
+              <a:rPr lang="en-US" dirty="0"/>
+              <a:t>Browser/Mobile</a:t>
+            </a:r>
+          </a:p>
+          <a:p>
+            <a:pPr algn="ctr"/>
+            <a:r>
+              <a:rPr lang="en-US" dirty="0"/>
+              <a:t>Device</a:t>
+            </a:r>
+          </a:p>
+        </p:txBody>
+      </p:sp>
+      <p:sp>
+        <p:nvSpPr>
+          <p:cNvPr id="8" name="TextBox 7">
+            <a:extLst>
+              <a:ext uri="{FF2B5EF4-FFF2-40B4-BE49-F238E27FC236}">
+                <a16:creationId xmlns:a16="http://schemas.microsoft.com/office/drawing/2014/main" id="{7AED64B9-9B69-1EB6-0D58-C2E1C4DDD9B0}"/>
+              </a:ext>
+            </a:extLst>
+          </p:cNvPr>
+          <p:cNvSpPr txBox="1"/>
+          <p:nvPr/>
+        </p:nvSpPr>
+        <p:spPr>
+          <a:xfrm>
+            <a:off x="3636418" y="2219495"/>
+            <a:ext cx="2002664" cy="369332"/>
+          </a:xfrm>
+          <a:prstGeom prst="rect">
+            <a:avLst/>
+          </a:prstGeom>
+          <a:noFill/>
+        </p:spPr>
+        <p:txBody>
+          <a:bodyPr wrap="none" rtlCol="0">
+            <a:spAutoFit/>
+          </a:bodyPr>
+          <a:lstStyle/>
+          <a:p>
+            <a:r>
+              <a:rPr lang="en-US" dirty="0"/>
+              <a:t>Backend Ecosystem</a:t>
+            </a:r>
+          </a:p>
+        </p:txBody>
+      </p:sp>
+      <p:sp>
+        <p:nvSpPr>
+          <p:cNvPr id="2" name="Oval 1">
+            <a:extLst>
+              <a:ext uri="{FF2B5EF4-FFF2-40B4-BE49-F238E27FC236}">
+                <a16:creationId xmlns:a16="http://schemas.microsoft.com/office/drawing/2014/main" id="{453B9045-950B-BBF8-7483-F7237D1A8946}"/>
+              </a:ext>
+            </a:extLst>
+          </p:cNvPr>
+          <p:cNvSpPr/>
+          <p:nvPr/>
+        </p:nvSpPr>
+        <p:spPr>
+          <a:xfrm>
+            <a:off x="3546536" y="4636615"/>
+            <a:ext cx="2212020" cy="967666"/>
+          </a:xfrm>
+          <a:prstGeom prst="ellipse">
+            <a:avLst/>
+          </a:prstGeom>
+          <a:solidFill>
+            <a:schemeClr val="bg1"/>
+          </a:solidFill>
+        </p:spPr>
+        <p:style>
+          <a:lnRef idx="2">
+            <a:schemeClr val="accent1">
+              <a:shade val="15000"/>
+            </a:schemeClr>
+          </a:lnRef>
+          <a:fillRef idx="1">
+            <a:schemeClr val="accent1"/>
+          </a:fillRef>
+          <a:effectRef idx="0">
+            <a:schemeClr val="accent1"/>
+          </a:effectRef>
+          <a:fontRef idx="minor">
+            <a:schemeClr val="lt1"/>
+          </a:fontRef>
+        </p:style>
+        <p:txBody>
+          <a:bodyPr rtlCol="0" anchor="ctr"/>
+          <a:lstStyle/>
+          <a:p>
+            <a:pPr algn="ctr"/>
+            <a:r>
+              <a:rPr lang="en-US" dirty="0">
+                <a:solidFill>
+                  <a:schemeClr val="tx1"/>
+                </a:solidFill>
+              </a:rPr>
+              <a:t>Eureka</a:t>
+            </a:r>
+          </a:p>
+          <a:p>
+            <a:pPr algn="ctr"/>
+            <a:r>
+              <a:rPr lang="en-US" dirty="0">
+                <a:solidFill>
+                  <a:schemeClr val="tx1"/>
+                </a:solidFill>
+              </a:rPr>
+              <a:t>Load Balancer</a:t>
+            </a:r>
+          </a:p>
+        </p:txBody>
+      </p:sp>
+      <p:cxnSp>
+        <p:nvCxnSpPr>
+          <p:cNvPr id="5" name="Straight Arrow Connector 4">
+            <a:extLst>
+              <a:ext uri="{FF2B5EF4-FFF2-40B4-BE49-F238E27FC236}">
+                <a16:creationId xmlns:a16="http://schemas.microsoft.com/office/drawing/2014/main" id="{360F12AF-65DE-5276-C193-69C297AB93BF}"/>
+              </a:ext>
+            </a:extLst>
+          </p:cNvPr>
+          <p:cNvCxnSpPr>
+            <a:cxnSpLocks/>
+            <a:endCxn id="15" idx="1"/>
+          </p:cNvCxnSpPr>
+          <p:nvPr/>
+        </p:nvCxnSpPr>
+        <p:spPr>
+          <a:xfrm flipV="1">
+            <a:off x="5758556" y="4159204"/>
+            <a:ext cx="1158179" cy="955308"/>
+          </a:xfrm>
+          <a:prstGeom prst="straightConnector1">
+            <a:avLst/>
+          </a:prstGeom>
+          <a:ln>
+            <a:tailEnd type="triangle"/>
+          </a:ln>
+        </p:spPr>
+        <p:style>
+          <a:lnRef idx="1">
+            <a:schemeClr val="accent1"/>
+          </a:lnRef>
+          <a:fillRef idx="0">
+            <a:schemeClr val="accent1"/>
+          </a:fillRef>
+          <a:effectRef idx="0">
+            <a:schemeClr val="accent1"/>
+          </a:effectRef>
+          <a:fontRef idx="minor">
+            <a:schemeClr val="tx1"/>
+          </a:fontRef>
+        </p:style>
+      </p:cxnSp>
+      <p:sp>
+        <p:nvSpPr>
+          <p:cNvPr id="16" name="Rectangle 15">
+            <a:extLst>
+              <a:ext uri="{FF2B5EF4-FFF2-40B4-BE49-F238E27FC236}">
+                <a16:creationId xmlns:a16="http://schemas.microsoft.com/office/drawing/2014/main" id="{7C5DB324-988C-A1DB-7648-91D2C2D07AE9}"/>
+              </a:ext>
+            </a:extLst>
+          </p:cNvPr>
+          <p:cNvSpPr/>
+          <p:nvPr/>
+        </p:nvSpPr>
+        <p:spPr>
+          <a:xfrm>
+            <a:off x="7254521" y="3991153"/>
+            <a:ext cx="1192567" cy="707993"/>
+          </a:xfrm>
+          <a:prstGeom prst="rect">
+            <a:avLst/>
+          </a:prstGeom>
+          <a:solidFill>
+            <a:schemeClr val="bg1"/>
+          </a:solidFill>
+        </p:spPr>
+        <p:style>
+          <a:lnRef idx="2">
+            <a:schemeClr val="accent1">
+              <a:shade val="15000"/>
+            </a:schemeClr>
+          </a:lnRef>
+          <a:fillRef idx="1">
+            <a:schemeClr val="accent1"/>
+          </a:fillRef>
+          <a:effectRef idx="0">
+            <a:schemeClr val="accent1"/>
+          </a:effectRef>
+          <a:fontRef idx="minor">
+            <a:schemeClr val="lt1"/>
+          </a:fontRef>
+        </p:style>
+        <p:txBody>
+          <a:bodyPr rtlCol="0" anchor="ctr"/>
+          <a:lstStyle/>
+          <a:p>
+            <a:pPr algn="ctr"/>
+            <a:r>
+              <a:rPr lang="en-US" dirty="0">
+                <a:solidFill>
+                  <a:schemeClr val="tx1"/>
+                </a:solidFill>
+              </a:rPr>
+              <a:t>REST</a:t>
+            </a:r>
+          </a:p>
+          <a:p>
+            <a:pPr algn="ctr"/>
+            <a:r>
+              <a:rPr lang="en-US" dirty="0">
+                <a:solidFill>
+                  <a:schemeClr val="tx1"/>
+                </a:solidFill>
+              </a:rPr>
+              <a:t>Service</a:t>
+            </a:r>
+          </a:p>
+        </p:txBody>
+      </p:sp>
+      <p:sp>
+        <p:nvSpPr>
+          <p:cNvPr id="17" name="Rectangle 16">
+            <a:extLst>
+              <a:ext uri="{FF2B5EF4-FFF2-40B4-BE49-F238E27FC236}">
+                <a16:creationId xmlns:a16="http://schemas.microsoft.com/office/drawing/2014/main" id="{A68CF99E-EA0F-2DF7-1005-6B1BDFCE1F8F}"/>
+              </a:ext>
+            </a:extLst>
+          </p:cNvPr>
+          <p:cNvSpPr/>
+          <p:nvPr/>
+        </p:nvSpPr>
+        <p:spPr>
+          <a:xfrm>
+            <a:off x="7238914" y="4931801"/>
+            <a:ext cx="1192567" cy="707993"/>
+          </a:xfrm>
+          <a:prstGeom prst="rect">
+            <a:avLst/>
+          </a:prstGeom>
+          <a:solidFill>
+            <a:schemeClr val="bg1"/>
+          </a:solidFill>
+        </p:spPr>
+        <p:style>
+          <a:lnRef idx="2">
+            <a:schemeClr val="accent1">
+              <a:shade val="15000"/>
+            </a:schemeClr>
+          </a:lnRef>
+          <a:fillRef idx="1">
+            <a:schemeClr val="accent1"/>
+          </a:fillRef>
+          <a:effectRef idx="0">
+            <a:schemeClr val="accent1"/>
+          </a:effectRef>
+          <a:fontRef idx="minor">
+            <a:schemeClr val="lt1"/>
+          </a:fontRef>
+        </p:style>
+        <p:txBody>
+          <a:bodyPr rtlCol="0" anchor="ctr"/>
+          <a:lstStyle/>
+          <a:p>
+            <a:pPr algn="ctr"/>
+            <a:r>
+              <a:rPr lang="en-US" dirty="0">
+                <a:solidFill>
+                  <a:schemeClr val="tx1"/>
+                </a:solidFill>
+              </a:rPr>
+              <a:t>REST</a:t>
+            </a:r>
+          </a:p>
+          <a:p>
+            <a:pPr algn="ctr"/>
+            <a:r>
+              <a:rPr lang="en-US" dirty="0">
+                <a:solidFill>
+                  <a:schemeClr val="tx1"/>
+                </a:solidFill>
+              </a:rPr>
+              <a:t>Service</a:t>
+            </a:r>
+          </a:p>
+        </p:txBody>
+      </p:sp>
+      <p:sp>
+        <p:nvSpPr>
+          <p:cNvPr id="20" name="Rectangle: Rounded Corners 19">
+            <a:extLst>
+              <a:ext uri="{FF2B5EF4-FFF2-40B4-BE49-F238E27FC236}">
+                <a16:creationId xmlns:a16="http://schemas.microsoft.com/office/drawing/2014/main" id="{12EEC572-972C-B906-E148-9A03C4D8A4C6}"/>
+              </a:ext>
+            </a:extLst>
+          </p:cNvPr>
+          <p:cNvSpPr/>
+          <p:nvPr/>
+        </p:nvSpPr>
+        <p:spPr>
+          <a:xfrm>
+            <a:off x="10020737" y="4037759"/>
+            <a:ext cx="1257670" cy="774579"/>
+          </a:xfrm>
+          <a:prstGeom prst="roundRect">
+            <a:avLst/>
+          </a:prstGeom>
+          <a:solidFill>
+            <a:schemeClr val="bg1"/>
+          </a:solidFill>
+        </p:spPr>
+        <p:style>
+          <a:lnRef idx="2">
+            <a:schemeClr val="accent1">
+              <a:shade val="15000"/>
+            </a:schemeClr>
+          </a:lnRef>
+          <a:fillRef idx="1">
+            <a:schemeClr val="accent1"/>
+          </a:fillRef>
+          <a:effectRef idx="0">
+            <a:schemeClr val="accent1"/>
+          </a:effectRef>
+          <a:fontRef idx="minor">
+            <a:schemeClr val="lt1"/>
+          </a:fontRef>
+        </p:style>
+        <p:txBody>
+          <a:bodyPr rtlCol="0" anchor="ctr"/>
+          <a:lstStyle/>
+          <a:p>
+            <a:pPr algn="ctr"/>
+            <a:r>
+              <a:rPr lang="en-US" dirty="0">
+                <a:solidFill>
+                  <a:schemeClr val="tx1"/>
+                </a:solidFill>
+              </a:rPr>
+              <a:t>MongoDB</a:t>
+            </a:r>
+          </a:p>
+          <a:p>
+            <a:pPr algn="ctr"/>
+            <a:r>
+              <a:rPr lang="en-US" dirty="0">
+                <a:solidFill>
+                  <a:schemeClr val="tx1"/>
+                </a:solidFill>
+              </a:rPr>
+              <a:t>Database</a:t>
+            </a:r>
+          </a:p>
+        </p:txBody>
+      </p:sp>
+      <p:sp>
+        <p:nvSpPr>
+          <p:cNvPr id="22" name="Rectangle: Rounded Corners 21">
+            <a:extLst>
+              <a:ext uri="{FF2B5EF4-FFF2-40B4-BE49-F238E27FC236}">
+                <a16:creationId xmlns:a16="http://schemas.microsoft.com/office/drawing/2014/main" id="{F6E68F80-9A67-8F68-CDB0-3232E9212D2D}"/>
+              </a:ext>
+            </a:extLst>
+          </p:cNvPr>
+          <p:cNvSpPr/>
+          <p:nvPr/>
+        </p:nvSpPr>
+        <p:spPr>
+          <a:xfrm>
+            <a:off x="9989099" y="4969531"/>
+            <a:ext cx="1257670" cy="774579"/>
+          </a:xfrm>
+          <a:prstGeom prst="roundRect">
+            <a:avLst/>
+          </a:prstGeom>
+          <a:solidFill>
+            <a:schemeClr val="bg1"/>
+          </a:solidFill>
+        </p:spPr>
+        <p:style>
+          <a:lnRef idx="2">
+            <a:schemeClr val="accent1">
+              <a:shade val="15000"/>
+            </a:schemeClr>
+          </a:lnRef>
+          <a:fillRef idx="1">
+            <a:schemeClr val="accent1"/>
+          </a:fillRef>
+          <a:effectRef idx="0">
+            <a:schemeClr val="accent1"/>
+          </a:effectRef>
+          <a:fontRef idx="minor">
+            <a:schemeClr val="lt1"/>
+          </a:fontRef>
+        </p:style>
+        <p:txBody>
+          <a:bodyPr rtlCol="0" anchor="ctr"/>
+          <a:lstStyle/>
+          <a:p>
+            <a:pPr algn="ctr"/>
+            <a:r>
+              <a:rPr lang="en-US" dirty="0">
+                <a:solidFill>
+                  <a:schemeClr val="tx1"/>
+                </a:solidFill>
+              </a:rPr>
+              <a:t>MongoDB</a:t>
+            </a:r>
+          </a:p>
+          <a:p>
+            <a:pPr algn="ctr"/>
+            <a:r>
+              <a:rPr lang="en-US" dirty="0">
+                <a:solidFill>
+                  <a:schemeClr val="tx1"/>
+                </a:solidFill>
+              </a:rPr>
+              <a:t>Database</a:t>
+            </a:r>
+          </a:p>
+        </p:txBody>
+      </p:sp>
+      <p:sp>
+        <p:nvSpPr>
+          <p:cNvPr id="23" name="TextBox 22">
+            <a:extLst>
+              <a:ext uri="{FF2B5EF4-FFF2-40B4-BE49-F238E27FC236}">
+                <a16:creationId xmlns:a16="http://schemas.microsoft.com/office/drawing/2014/main" id="{618DB1D6-3813-FCEB-8D26-46BB88E09D94}"/>
+              </a:ext>
+            </a:extLst>
+          </p:cNvPr>
+          <p:cNvSpPr txBox="1"/>
+          <p:nvPr/>
+        </p:nvSpPr>
+        <p:spPr>
+          <a:xfrm>
+            <a:off x="10031315" y="2343946"/>
+            <a:ext cx="1278107" cy="646331"/>
+          </a:xfrm>
+          <a:prstGeom prst="rect">
+            <a:avLst/>
+          </a:prstGeom>
+          <a:noFill/>
+        </p:spPr>
+        <p:txBody>
+          <a:bodyPr wrap="none" rtlCol="0">
+            <a:spAutoFit/>
+          </a:bodyPr>
+          <a:lstStyle/>
+          <a:p>
+            <a:pPr algn="ctr"/>
+            <a:r>
+              <a:rPr lang="en-US" dirty="0"/>
+              <a:t>Three-node</a:t>
+            </a:r>
+          </a:p>
+          <a:p>
+            <a:r>
+              <a:rPr lang="en-US" dirty="0"/>
+              <a:t>Replicaset</a:t>
+            </a:r>
+          </a:p>
+        </p:txBody>
+      </p:sp>
+      <p:cxnSp>
+        <p:nvCxnSpPr>
+          <p:cNvPr id="25" name="Straight Arrow Connector 24">
+            <a:extLst>
+              <a:ext uri="{FF2B5EF4-FFF2-40B4-BE49-F238E27FC236}">
+                <a16:creationId xmlns:a16="http://schemas.microsoft.com/office/drawing/2014/main" id="{C153E134-D800-FAF8-BE46-3D22CC7DBAE3}"/>
+              </a:ext>
+            </a:extLst>
+          </p:cNvPr>
+          <p:cNvCxnSpPr>
+            <a:cxnSpLocks/>
+          </p:cNvCxnSpPr>
+          <p:nvPr/>
+        </p:nvCxnSpPr>
+        <p:spPr>
+          <a:xfrm>
+            <a:off x="8753662" y="4074853"/>
+            <a:ext cx="945809" cy="0"/>
+          </a:xfrm>
+          <a:prstGeom prst="straightConnector1">
+            <a:avLst/>
+          </a:prstGeom>
+          <a:ln>
+            <a:tailEnd type="triangle"/>
+          </a:ln>
+        </p:spPr>
+        <p:style>
+          <a:lnRef idx="1">
+            <a:schemeClr val="accent1"/>
+          </a:lnRef>
+          <a:fillRef idx="0">
+            <a:schemeClr val="accent1"/>
+          </a:fillRef>
+          <a:effectRef idx="0">
+            <a:schemeClr val="accent1"/>
+          </a:effectRef>
+          <a:fontRef idx="minor">
+            <a:schemeClr val="tx1"/>
+          </a:fontRef>
+        </p:style>
+      </p:cxnSp>
+      <p:sp>
+        <p:nvSpPr>
+          <p:cNvPr id="27" name="TextBox 26">
+            <a:extLst>
+              <a:ext uri="{FF2B5EF4-FFF2-40B4-BE49-F238E27FC236}">
+                <a16:creationId xmlns:a16="http://schemas.microsoft.com/office/drawing/2014/main" id="{E3D9E6F7-39E1-ABBA-104C-BA4D266587A4}"/>
+              </a:ext>
+            </a:extLst>
+          </p:cNvPr>
+          <p:cNvSpPr txBox="1"/>
+          <p:nvPr/>
+        </p:nvSpPr>
+        <p:spPr>
+          <a:xfrm>
+            <a:off x="7219583" y="2341009"/>
+            <a:ext cx="1362745" cy="646331"/>
+          </a:xfrm>
+          <a:prstGeom prst="rect">
+            <a:avLst/>
+          </a:prstGeom>
+          <a:noFill/>
+        </p:spPr>
+        <p:txBody>
+          <a:bodyPr wrap="none" rtlCol="0">
+            <a:spAutoFit/>
+          </a:bodyPr>
+          <a:lstStyle/>
+          <a:p>
+            <a:pPr algn="ctr"/>
+            <a:r>
+              <a:rPr lang="en-US" dirty="0"/>
+              <a:t>REST Service</a:t>
+            </a:r>
+          </a:p>
+          <a:p>
+            <a:pPr algn="ctr"/>
+            <a:r>
+              <a:rPr lang="en-US" dirty="0"/>
+              <a:t>Cluster</a:t>
+            </a:r>
+          </a:p>
+        </p:txBody>
+      </p:sp>
+    </p:spTree>
+    <p:extLst>
+      <p:ext uri="{BB962C8B-B14F-4D97-AF65-F5344CB8AC3E}">
+        <p14:creationId xmlns:p14="http://schemas.microsoft.com/office/powerpoint/2010/main" val="2122472165"/>
+      </p:ext>
+    </p:extLst>
+  </p:cSld>
+  <p:clrMapOvr>
+    <a:masterClrMapping/>
+  </p:clrMapOvr>
+</p:sld>
+</file>
+
 <file path=ppt/theme/theme1.xml><?xml version="1.0" encoding="utf-8"?>
 <a:theme xmlns:a="http://schemas.openxmlformats.org/drawingml/2006/main" name="Office Theme">
   <a:themeElements>

</xml_diff>